<commit_message>
Added some more sldies
</commit_message>
<xml_diff>
--- a/Presentation/Neeraj/Presentation.pptx
+++ b/Presentation/Neeraj/Presentation.pptx
@@ -71,8 +71,8 @@
         </p:nvSpPr>
         <p:spPr>
           <a:xfrm>
-            <a:off x="2700000" y="2700000"/>
-            <a:ext cx="4679640" cy="2159640"/>
+            <a:off x="504000" y="301320"/>
+            <a:ext cx="9072000" cy="1261800"/>
           </a:xfrm>
           <a:prstGeom prst="rect">
             <a:avLst/>
@@ -100,8 +100,8 @@
         </p:nvSpPr>
         <p:spPr>
           <a:xfrm>
-            <a:off x="3420000" y="5040000"/>
-            <a:ext cx="6299640" cy="1029960"/>
+            <a:off x="504000" y="1768680"/>
+            <a:ext cx="9072000" cy="2090880"/>
           </a:xfrm>
           <a:prstGeom prst="rect">
             <a:avLst/>
@@ -130,8 +130,8 @@
         </p:nvSpPr>
         <p:spPr>
           <a:xfrm>
-            <a:off x="3420000" y="6168240"/>
-            <a:ext cx="6299640" cy="1029960"/>
+            <a:off x="504000" y="4058640"/>
+            <a:ext cx="9072000" cy="2090880"/>
           </a:xfrm>
           <a:prstGeom prst="rect">
             <a:avLst/>
@@ -182,8 +182,8 @@
         </p:nvSpPr>
         <p:spPr>
           <a:xfrm>
-            <a:off x="2700000" y="2700000"/>
-            <a:ext cx="4679640" cy="2159640"/>
+            <a:off x="504000" y="301320"/>
+            <a:ext cx="9072000" cy="1261800"/>
           </a:xfrm>
           <a:prstGeom prst="rect">
             <a:avLst/>
@@ -211,8 +211,8 @@
         </p:nvSpPr>
         <p:spPr>
           <a:xfrm>
-            <a:off x="3420000" y="5040000"/>
-            <a:ext cx="3074040" cy="1029960"/>
+            <a:off x="504000" y="1768680"/>
+            <a:ext cx="4426920" cy="2090880"/>
           </a:xfrm>
           <a:prstGeom prst="rect">
             <a:avLst/>
@@ -241,8 +241,8 @@
         </p:nvSpPr>
         <p:spPr>
           <a:xfrm>
-            <a:off x="6648120" y="5040000"/>
-            <a:ext cx="3074040" cy="1029960"/>
+            <a:off x="5152680" y="1768680"/>
+            <a:ext cx="4426920" cy="2090880"/>
           </a:xfrm>
           <a:prstGeom prst="rect">
             <a:avLst/>
@@ -271,8 +271,8 @@
         </p:nvSpPr>
         <p:spPr>
           <a:xfrm>
-            <a:off x="6648120" y="6168240"/>
-            <a:ext cx="3074040" cy="1029960"/>
+            <a:off x="5152680" y="4058640"/>
+            <a:ext cx="4426920" cy="2090880"/>
           </a:xfrm>
           <a:prstGeom prst="rect">
             <a:avLst/>
@@ -301,8 +301,8 @@
         </p:nvSpPr>
         <p:spPr>
           <a:xfrm>
-            <a:off x="3420000" y="6168240"/>
-            <a:ext cx="3074040" cy="1029960"/>
+            <a:off x="504000" y="4058640"/>
+            <a:ext cx="4426920" cy="2090880"/>
           </a:xfrm>
           <a:prstGeom prst="rect">
             <a:avLst/>
@@ -353,8 +353,8 @@
         </p:nvSpPr>
         <p:spPr>
           <a:xfrm>
-            <a:off x="2700000" y="2700000"/>
-            <a:ext cx="4679640" cy="2159640"/>
+            <a:off x="504000" y="301320"/>
+            <a:ext cx="9072000" cy="1261800"/>
           </a:xfrm>
           <a:prstGeom prst="rect">
             <a:avLst/>
@@ -382,8 +382,8 @@
         </p:nvSpPr>
         <p:spPr>
           <a:xfrm>
-            <a:off x="3420000" y="5040000"/>
-            <a:ext cx="2028240" cy="1029960"/>
+            <a:off x="504000" y="1768680"/>
+            <a:ext cx="2921040" cy="2090880"/>
           </a:xfrm>
           <a:prstGeom prst="rect">
             <a:avLst/>
@@ -412,8 +412,8 @@
         </p:nvSpPr>
         <p:spPr>
           <a:xfrm>
-            <a:off x="5550120" y="5040000"/>
-            <a:ext cx="2028240" cy="1029960"/>
+            <a:off x="3571560" y="1768680"/>
+            <a:ext cx="2921040" cy="2090880"/>
           </a:xfrm>
           <a:prstGeom prst="rect">
             <a:avLst/>
@@ -442,8 +442,8 @@
         </p:nvSpPr>
         <p:spPr>
           <a:xfrm>
-            <a:off x="7680240" y="5040000"/>
-            <a:ext cx="2028240" cy="1029960"/>
+            <a:off x="6639120" y="1768680"/>
+            <a:ext cx="2921040" cy="2090880"/>
           </a:xfrm>
           <a:prstGeom prst="rect">
             <a:avLst/>
@@ -472,8 +472,8 @@
         </p:nvSpPr>
         <p:spPr>
           <a:xfrm>
-            <a:off x="7680240" y="6168240"/>
-            <a:ext cx="2028240" cy="1029960"/>
+            <a:off x="6639120" y="4058640"/>
+            <a:ext cx="2921040" cy="2090880"/>
           </a:xfrm>
           <a:prstGeom prst="rect">
             <a:avLst/>
@@ -502,8 +502,8 @@
         </p:nvSpPr>
         <p:spPr>
           <a:xfrm>
-            <a:off x="5550120" y="6168240"/>
-            <a:ext cx="2028240" cy="1029960"/>
+            <a:off x="3571560" y="4058640"/>
+            <a:ext cx="2921040" cy="2090880"/>
           </a:xfrm>
           <a:prstGeom prst="rect">
             <a:avLst/>
@@ -532,8 +532,8 @@
         </p:nvSpPr>
         <p:spPr>
           <a:xfrm>
-            <a:off x="3420000" y="6168240"/>
-            <a:ext cx="2028240" cy="1029960"/>
+            <a:off x="504000" y="4058640"/>
+            <a:ext cx="2921040" cy="2090880"/>
           </a:xfrm>
           <a:prstGeom prst="rect">
             <a:avLst/>
@@ -606,8 +606,8 @@
         </p:nvSpPr>
         <p:spPr>
           <a:xfrm>
-            <a:off x="2700000" y="2700000"/>
-            <a:ext cx="4679640" cy="2159640"/>
+            <a:off x="504000" y="301320"/>
+            <a:ext cx="9072000" cy="1261800"/>
           </a:xfrm>
           <a:prstGeom prst="rect">
             <a:avLst/>
@@ -635,8 +635,8 @@
         </p:nvSpPr>
         <p:spPr>
           <a:xfrm>
-            <a:off x="3420000" y="5040000"/>
-            <a:ext cx="6299640" cy="2159640"/>
+            <a:off x="504000" y="1768680"/>
+            <a:ext cx="9072000" cy="4384080"/>
           </a:xfrm>
           <a:prstGeom prst="rect">
             <a:avLst/>
@@ -686,8 +686,8 @@
         </p:nvSpPr>
         <p:spPr>
           <a:xfrm>
-            <a:off x="2700000" y="2700000"/>
-            <a:ext cx="4679640" cy="2159640"/>
+            <a:off x="504000" y="301320"/>
+            <a:ext cx="9072000" cy="1261800"/>
           </a:xfrm>
           <a:prstGeom prst="rect">
             <a:avLst/>
@@ -715,8 +715,8 @@
         </p:nvSpPr>
         <p:spPr>
           <a:xfrm>
-            <a:off x="3420000" y="5040000"/>
-            <a:ext cx="6299640" cy="2159640"/>
+            <a:off x="504000" y="1768680"/>
+            <a:ext cx="9072000" cy="4384080"/>
           </a:xfrm>
           <a:prstGeom prst="rect">
             <a:avLst/>
@@ -767,8 +767,8 @@
         </p:nvSpPr>
         <p:spPr>
           <a:xfrm>
-            <a:off x="2700000" y="2700000"/>
-            <a:ext cx="4679640" cy="2159640"/>
+            <a:off x="504000" y="301320"/>
+            <a:ext cx="9072000" cy="1261800"/>
           </a:xfrm>
           <a:prstGeom prst="rect">
             <a:avLst/>
@@ -796,8 +796,8 @@
         </p:nvSpPr>
         <p:spPr>
           <a:xfrm>
-            <a:off x="3420000" y="5040000"/>
-            <a:ext cx="3074040" cy="2159640"/>
+            <a:off x="504000" y="1768680"/>
+            <a:ext cx="4426920" cy="4384080"/>
           </a:xfrm>
           <a:prstGeom prst="rect">
             <a:avLst/>
@@ -826,8 +826,8 @@
         </p:nvSpPr>
         <p:spPr>
           <a:xfrm>
-            <a:off x="6648120" y="5040000"/>
-            <a:ext cx="3074040" cy="2159640"/>
+            <a:off x="5152680" y="1768680"/>
+            <a:ext cx="4426920" cy="4384080"/>
           </a:xfrm>
           <a:prstGeom prst="rect">
             <a:avLst/>
@@ -878,8 +878,8 @@
         </p:nvSpPr>
         <p:spPr>
           <a:xfrm>
-            <a:off x="2700000" y="2700000"/>
-            <a:ext cx="4679640" cy="2159640"/>
+            <a:off x="504000" y="301320"/>
+            <a:ext cx="9072000" cy="1261800"/>
           </a:xfrm>
           <a:prstGeom prst="rect">
             <a:avLst/>
@@ -929,8 +929,8 @@
         </p:nvSpPr>
         <p:spPr>
           <a:xfrm>
-            <a:off x="2700000" y="2700000"/>
-            <a:ext cx="4679640" cy="10011960"/>
+            <a:off x="504000" y="301320"/>
+            <a:ext cx="9072000" cy="5850360"/>
           </a:xfrm>
           <a:prstGeom prst="rect">
             <a:avLst/>
@@ -980,8 +980,8 @@
         </p:nvSpPr>
         <p:spPr>
           <a:xfrm>
-            <a:off x="2700000" y="2700000"/>
-            <a:ext cx="4679640" cy="2159640"/>
+            <a:off x="504000" y="301320"/>
+            <a:ext cx="9072000" cy="1261800"/>
           </a:xfrm>
           <a:prstGeom prst="rect">
             <a:avLst/>
@@ -1009,8 +1009,8 @@
         </p:nvSpPr>
         <p:spPr>
           <a:xfrm>
-            <a:off x="3420000" y="5040000"/>
-            <a:ext cx="3074040" cy="1029960"/>
+            <a:off x="504000" y="1768680"/>
+            <a:ext cx="4426920" cy="2090880"/>
           </a:xfrm>
           <a:prstGeom prst="rect">
             <a:avLst/>
@@ -1039,8 +1039,8 @@
         </p:nvSpPr>
         <p:spPr>
           <a:xfrm>
-            <a:off x="3420000" y="6168240"/>
-            <a:ext cx="3074040" cy="1029960"/>
+            <a:off x="504000" y="4058640"/>
+            <a:ext cx="4426920" cy="2090880"/>
           </a:xfrm>
           <a:prstGeom prst="rect">
             <a:avLst/>
@@ -1069,8 +1069,8 @@
         </p:nvSpPr>
         <p:spPr>
           <a:xfrm>
-            <a:off x="6648120" y="5040000"/>
-            <a:ext cx="3074040" cy="2159640"/>
+            <a:off x="5152680" y="1768680"/>
+            <a:ext cx="4426920" cy="4384080"/>
           </a:xfrm>
           <a:prstGeom prst="rect">
             <a:avLst/>
@@ -1121,8 +1121,8 @@
         </p:nvSpPr>
         <p:spPr>
           <a:xfrm>
-            <a:off x="2700000" y="2700000"/>
-            <a:ext cx="4679640" cy="2159640"/>
+            <a:off x="504000" y="301320"/>
+            <a:ext cx="9072000" cy="1261800"/>
           </a:xfrm>
           <a:prstGeom prst="rect">
             <a:avLst/>
@@ -1150,8 +1150,8 @@
         </p:nvSpPr>
         <p:spPr>
           <a:xfrm>
-            <a:off x="3420000" y="5040000"/>
-            <a:ext cx="6299640" cy="2159640"/>
+            <a:off x="504000" y="1768680"/>
+            <a:ext cx="9072000" cy="4384080"/>
           </a:xfrm>
           <a:prstGeom prst="rect">
             <a:avLst/>
@@ -1201,8 +1201,8 @@
         </p:nvSpPr>
         <p:spPr>
           <a:xfrm>
-            <a:off x="2700000" y="2700000"/>
-            <a:ext cx="4679640" cy="2159640"/>
+            <a:off x="504000" y="301320"/>
+            <a:ext cx="9072000" cy="1261800"/>
           </a:xfrm>
           <a:prstGeom prst="rect">
             <a:avLst/>
@@ -1230,8 +1230,8 @@
         </p:nvSpPr>
         <p:spPr>
           <a:xfrm>
-            <a:off x="3420000" y="5040000"/>
-            <a:ext cx="3074040" cy="2159640"/>
+            <a:off x="504000" y="1768680"/>
+            <a:ext cx="4426920" cy="4384080"/>
           </a:xfrm>
           <a:prstGeom prst="rect">
             <a:avLst/>
@@ -1260,8 +1260,8 @@
         </p:nvSpPr>
         <p:spPr>
           <a:xfrm>
-            <a:off x="6648120" y="5040000"/>
-            <a:ext cx="3074040" cy="1029960"/>
+            <a:off x="5152680" y="1768680"/>
+            <a:ext cx="4426920" cy="2090880"/>
           </a:xfrm>
           <a:prstGeom prst="rect">
             <a:avLst/>
@@ -1290,8 +1290,8 @@
         </p:nvSpPr>
         <p:spPr>
           <a:xfrm>
-            <a:off x="6648120" y="6168240"/>
-            <a:ext cx="3074040" cy="1029960"/>
+            <a:off x="5152680" y="4058640"/>
+            <a:ext cx="4426920" cy="2090880"/>
           </a:xfrm>
           <a:prstGeom prst="rect">
             <a:avLst/>
@@ -1342,8 +1342,8 @@
         </p:nvSpPr>
         <p:spPr>
           <a:xfrm>
-            <a:off x="2700000" y="2700000"/>
-            <a:ext cx="4679640" cy="2159640"/>
+            <a:off x="504000" y="301320"/>
+            <a:ext cx="9072000" cy="1261800"/>
           </a:xfrm>
           <a:prstGeom prst="rect">
             <a:avLst/>
@@ -1371,8 +1371,8 @@
         </p:nvSpPr>
         <p:spPr>
           <a:xfrm>
-            <a:off x="3420000" y="5040000"/>
-            <a:ext cx="3074040" cy="1029960"/>
+            <a:off x="504000" y="1768680"/>
+            <a:ext cx="4426920" cy="2090880"/>
           </a:xfrm>
           <a:prstGeom prst="rect">
             <a:avLst/>
@@ -1401,8 +1401,8 @@
         </p:nvSpPr>
         <p:spPr>
           <a:xfrm>
-            <a:off x="6648120" y="5040000"/>
-            <a:ext cx="3074040" cy="1029960"/>
+            <a:off x="5152680" y="1768680"/>
+            <a:ext cx="4426920" cy="2090880"/>
           </a:xfrm>
           <a:prstGeom prst="rect">
             <a:avLst/>
@@ -1431,8 +1431,8 @@
         </p:nvSpPr>
         <p:spPr>
           <a:xfrm>
-            <a:off x="3420000" y="6168240"/>
-            <a:ext cx="6299640" cy="1029960"/>
+            <a:off x="504000" y="4058640"/>
+            <a:ext cx="9072000" cy="2090880"/>
           </a:xfrm>
           <a:prstGeom prst="rect">
             <a:avLst/>
@@ -1483,8 +1483,8 @@
         </p:nvSpPr>
         <p:spPr>
           <a:xfrm>
-            <a:off x="2700000" y="2700000"/>
-            <a:ext cx="4679640" cy="2159640"/>
+            <a:off x="504000" y="301320"/>
+            <a:ext cx="9072000" cy="1261800"/>
           </a:xfrm>
           <a:prstGeom prst="rect">
             <a:avLst/>
@@ -1512,8 +1512,8 @@
         </p:nvSpPr>
         <p:spPr>
           <a:xfrm>
-            <a:off x="3420000" y="5040000"/>
-            <a:ext cx="6299640" cy="1029960"/>
+            <a:off x="504000" y="1768680"/>
+            <a:ext cx="9072000" cy="2090880"/>
           </a:xfrm>
           <a:prstGeom prst="rect">
             <a:avLst/>
@@ -1542,8 +1542,8 @@
         </p:nvSpPr>
         <p:spPr>
           <a:xfrm>
-            <a:off x="3420000" y="6168240"/>
-            <a:ext cx="6299640" cy="1029960"/>
+            <a:off x="504000" y="4058640"/>
+            <a:ext cx="9072000" cy="2090880"/>
           </a:xfrm>
           <a:prstGeom prst="rect">
             <a:avLst/>
@@ -1594,8 +1594,8 @@
         </p:nvSpPr>
         <p:spPr>
           <a:xfrm>
-            <a:off x="2700000" y="2700000"/>
-            <a:ext cx="4679640" cy="2159640"/>
+            <a:off x="504000" y="301320"/>
+            <a:ext cx="9072000" cy="1261800"/>
           </a:xfrm>
           <a:prstGeom prst="rect">
             <a:avLst/>
@@ -1623,8 +1623,8 @@
         </p:nvSpPr>
         <p:spPr>
           <a:xfrm>
-            <a:off x="3420000" y="5040000"/>
-            <a:ext cx="3074040" cy="1029960"/>
+            <a:off x="504000" y="1768680"/>
+            <a:ext cx="4426920" cy="2090880"/>
           </a:xfrm>
           <a:prstGeom prst="rect">
             <a:avLst/>
@@ -1653,8 +1653,8 @@
         </p:nvSpPr>
         <p:spPr>
           <a:xfrm>
-            <a:off x="6648120" y="5040000"/>
-            <a:ext cx="3074040" cy="1029960"/>
+            <a:off x="5152680" y="1768680"/>
+            <a:ext cx="4426920" cy="2090880"/>
           </a:xfrm>
           <a:prstGeom prst="rect">
             <a:avLst/>
@@ -1683,8 +1683,8 @@
         </p:nvSpPr>
         <p:spPr>
           <a:xfrm>
-            <a:off x="6648120" y="6168240"/>
-            <a:ext cx="3074040" cy="1029960"/>
+            <a:off x="5152680" y="4058640"/>
+            <a:ext cx="4426920" cy="2090880"/>
           </a:xfrm>
           <a:prstGeom prst="rect">
             <a:avLst/>
@@ -1713,8 +1713,8 @@
         </p:nvSpPr>
         <p:spPr>
           <a:xfrm>
-            <a:off x="3420000" y="6168240"/>
-            <a:ext cx="3074040" cy="1029960"/>
+            <a:off x="504000" y="4058640"/>
+            <a:ext cx="4426920" cy="2090880"/>
           </a:xfrm>
           <a:prstGeom prst="rect">
             <a:avLst/>
@@ -1765,8 +1765,8 @@
         </p:nvSpPr>
         <p:spPr>
           <a:xfrm>
-            <a:off x="2700000" y="2700000"/>
-            <a:ext cx="4679640" cy="2159640"/>
+            <a:off x="504000" y="301320"/>
+            <a:ext cx="9072000" cy="1261800"/>
           </a:xfrm>
           <a:prstGeom prst="rect">
             <a:avLst/>
@@ -1794,8 +1794,8 @@
         </p:nvSpPr>
         <p:spPr>
           <a:xfrm>
-            <a:off x="3420000" y="5040000"/>
-            <a:ext cx="2028240" cy="1029960"/>
+            <a:off x="504000" y="1768680"/>
+            <a:ext cx="2921040" cy="2090880"/>
           </a:xfrm>
           <a:prstGeom prst="rect">
             <a:avLst/>
@@ -1824,8 +1824,8 @@
         </p:nvSpPr>
         <p:spPr>
           <a:xfrm>
-            <a:off x="5550120" y="5040000"/>
-            <a:ext cx="2028240" cy="1029960"/>
+            <a:off x="3571560" y="1768680"/>
+            <a:ext cx="2921040" cy="2090880"/>
           </a:xfrm>
           <a:prstGeom prst="rect">
             <a:avLst/>
@@ -1854,8 +1854,8 @@
         </p:nvSpPr>
         <p:spPr>
           <a:xfrm>
-            <a:off x="7680240" y="5040000"/>
-            <a:ext cx="2028240" cy="1029960"/>
+            <a:off x="6639120" y="1768680"/>
+            <a:ext cx="2921040" cy="2090880"/>
           </a:xfrm>
           <a:prstGeom prst="rect">
             <a:avLst/>
@@ -1884,8 +1884,8 @@
         </p:nvSpPr>
         <p:spPr>
           <a:xfrm>
-            <a:off x="7680240" y="6168240"/>
-            <a:ext cx="2028240" cy="1029960"/>
+            <a:off x="6639120" y="4058640"/>
+            <a:ext cx="2921040" cy="2090880"/>
           </a:xfrm>
           <a:prstGeom prst="rect">
             <a:avLst/>
@@ -1914,8 +1914,8 @@
         </p:nvSpPr>
         <p:spPr>
           <a:xfrm>
-            <a:off x="5550120" y="6168240"/>
-            <a:ext cx="2028240" cy="1029960"/>
+            <a:off x="3571560" y="4058640"/>
+            <a:ext cx="2921040" cy="2090880"/>
           </a:xfrm>
           <a:prstGeom prst="rect">
             <a:avLst/>
@@ -1944,8 +1944,8 @@
         </p:nvSpPr>
         <p:spPr>
           <a:xfrm>
-            <a:off x="3420000" y="6168240"/>
-            <a:ext cx="2028240" cy="1029960"/>
+            <a:off x="504000" y="4058640"/>
+            <a:ext cx="2921040" cy="2090880"/>
           </a:xfrm>
           <a:prstGeom prst="rect">
             <a:avLst/>
@@ -2018,8 +2018,8 @@
         </p:nvSpPr>
         <p:spPr>
           <a:xfrm>
-            <a:off x="2700000" y="2700000"/>
-            <a:ext cx="4679640" cy="2159640"/>
+            <a:off x="504000" y="301320"/>
+            <a:ext cx="9072000" cy="1261800"/>
           </a:xfrm>
           <a:prstGeom prst="rect">
             <a:avLst/>
@@ -2047,8 +2047,8 @@
         </p:nvSpPr>
         <p:spPr>
           <a:xfrm>
-            <a:off x="3420000" y="5040000"/>
-            <a:ext cx="6299640" cy="2159640"/>
+            <a:off x="504000" y="1768680"/>
+            <a:ext cx="9072000" cy="4384080"/>
           </a:xfrm>
           <a:prstGeom prst="rect">
             <a:avLst/>
@@ -2098,8 +2098,8 @@
         </p:nvSpPr>
         <p:spPr>
           <a:xfrm>
-            <a:off x="2700000" y="2700000"/>
-            <a:ext cx="4679640" cy="2159640"/>
+            <a:off x="504000" y="301320"/>
+            <a:ext cx="9072000" cy="1261800"/>
           </a:xfrm>
           <a:prstGeom prst="rect">
             <a:avLst/>
@@ -2127,8 +2127,8 @@
         </p:nvSpPr>
         <p:spPr>
           <a:xfrm>
-            <a:off x="3420000" y="5040000"/>
-            <a:ext cx="6299640" cy="2159640"/>
+            <a:off x="504000" y="1768680"/>
+            <a:ext cx="9072000" cy="4384080"/>
           </a:xfrm>
           <a:prstGeom prst="rect">
             <a:avLst/>
@@ -2179,8 +2179,8 @@
         </p:nvSpPr>
         <p:spPr>
           <a:xfrm>
-            <a:off x="2700000" y="2700000"/>
-            <a:ext cx="4679640" cy="2159640"/>
+            <a:off x="504000" y="301320"/>
+            <a:ext cx="9072000" cy="1261800"/>
           </a:xfrm>
           <a:prstGeom prst="rect">
             <a:avLst/>
@@ -2208,8 +2208,8 @@
         </p:nvSpPr>
         <p:spPr>
           <a:xfrm>
-            <a:off x="3420000" y="5040000"/>
-            <a:ext cx="3074040" cy="2159640"/>
+            <a:off x="504000" y="1768680"/>
+            <a:ext cx="4426920" cy="4384080"/>
           </a:xfrm>
           <a:prstGeom prst="rect">
             <a:avLst/>
@@ -2238,8 +2238,8 @@
         </p:nvSpPr>
         <p:spPr>
           <a:xfrm>
-            <a:off x="6648120" y="5040000"/>
-            <a:ext cx="3074040" cy="2159640"/>
+            <a:off x="5152680" y="1768680"/>
+            <a:ext cx="4426920" cy="4384080"/>
           </a:xfrm>
           <a:prstGeom prst="rect">
             <a:avLst/>
@@ -2290,8 +2290,8 @@
         </p:nvSpPr>
         <p:spPr>
           <a:xfrm>
-            <a:off x="2700000" y="2700000"/>
-            <a:ext cx="4679640" cy="2159640"/>
+            <a:off x="504000" y="301320"/>
+            <a:ext cx="9072000" cy="1261800"/>
           </a:xfrm>
           <a:prstGeom prst="rect">
             <a:avLst/>
@@ -2341,8 +2341,8 @@
         </p:nvSpPr>
         <p:spPr>
           <a:xfrm>
-            <a:off x="2700000" y="2700000"/>
-            <a:ext cx="4679640" cy="2159640"/>
+            <a:off x="504000" y="301320"/>
+            <a:ext cx="9072000" cy="1261800"/>
           </a:xfrm>
           <a:prstGeom prst="rect">
             <a:avLst/>
@@ -2370,8 +2370,8 @@
         </p:nvSpPr>
         <p:spPr>
           <a:xfrm>
-            <a:off x="3420000" y="5040000"/>
-            <a:ext cx="6299640" cy="2159640"/>
+            <a:off x="504000" y="1768680"/>
+            <a:ext cx="9072000" cy="4384080"/>
           </a:xfrm>
           <a:prstGeom prst="rect">
             <a:avLst/>
@@ -2422,8 +2422,8 @@
         </p:nvSpPr>
         <p:spPr>
           <a:xfrm>
-            <a:off x="2700000" y="2700000"/>
-            <a:ext cx="4679640" cy="10011960"/>
+            <a:off x="504000" y="301320"/>
+            <a:ext cx="9072000" cy="5850360"/>
           </a:xfrm>
           <a:prstGeom prst="rect">
             <a:avLst/>
@@ -2473,8 +2473,8 @@
         </p:nvSpPr>
         <p:spPr>
           <a:xfrm>
-            <a:off x="2700000" y="2700000"/>
-            <a:ext cx="4679640" cy="2159640"/>
+            <a:off x="504000" y="301320"/>
+            <a:ext cx="9072000" cy="1261800"/>
           </a:xfrm>
           <a:prstGeom prst="rect">
             <a:avLst/>
@@ -2502,8 +2502,8 @@
         </p:nvSpPr>
         <p:spPr>
           <a:xfrm>
-            <a:off x="3420000" y="5040000"/>
-            <a:ext cx="3074040" cy="1029960"/>
+            <a:off x="504000" y="1768680"/>
+            <a:ext cx="4426920" cy="2090880"/>
           </a:xfrm>
           <a:prstGeom prst="rect">
             <a:avLst/>
@@ -2532,8 +2532,8 @@
         </p:nvSpPr>
         <p:spPr>
           <a:xfrm>
-            <a:off x="3420000" y="6168240"/>
-            <a:ext cx="3074040" cy="1029960"/>
+            <a:off x="504000" y="4058640"/>
+            <a:ext cx="4426920" cy="2090880"/>
           </a:xfrm>
           <a:prstGeom prst="rect">
             <a:avLst/>
@@ -2562,8 +2562,8 @@
         </p:nvSpPr>
         <p:spPr>
           <a:xfrm>
-            <a:off x="6648120" y="5040000"/>
-            <a:ext cx="3074040" cy="2159640"/>
+            <a:off x="5152680" y="1768680"/>
+            <a:ext cx="4426920" cy="4384080"/>
           </a:xfrm>
           <a:prstGeom prst="rect">
             <a:avLst/>
@@ -2614,8 +2614,8 @@
         </p:nvSpPr>
         <p:spPr>
           <a:xfrm>
-            <a:off x="2700000" y="2700000"/>
-            <a:ext cx="4679640" cy="2159640"/>
+            <a:off x="504000" y="301320"/>
+            <a:ext cx="9072000" cy="1261800"/>
           </a:xfrm>
           <a:prstGeom prst="rect">
             <a:avLst/>
@@ -2643,8 +2643,8 @@
         </p:nvSpPr>
         <p:spPr>
           <a:xfrm>
-            <a:off x="3420000" y="5040000"/>
-            <a:ext cx="3074040" cy="2159640"/>
+            <a:off x="504000" y="1768680"/>
+            <a:ext cx="4426920" cy="4384080"/>
           </a:xfrm>
           <a:prstGeom prst="rect">
             <a:avLst/>
@@ -2673,8 +2673,8 @@
         </p:nvSpPr>
         <p:spPr>
           <a:xfrm>
-            <a:off x="6648120" y="5040000"/>
-            <a:ext cx="3074040" cy="1029960"/>
+            <a:off x="5152680" y="1768680"/>
+            <a:ext cx="4426920" cy="2090880"/>
           </a:xfrm>
           <a:prstGeom prst="rect">
             <a:avLst/>
@@ -2703,8 +2703,8 @@
         </p:nvSpPr>
         <p:spPr>
           <a:xfrm>
-            <a:off x="6648120" y="6168240"/>
-            <a:ext cx="3074040" cy="1029960"/>
+            <a:off x="5152680" y="4058640"/>
+            <a:ext cx="4426920" cy="2090880"/>
           </a:xfrm>
           <a:prstGeom prst="rect">
             <a:avLst/>
@@ -2755,8 +2755,8 @@
         </p:nvSpPr>
         <p:spPr>
           <a:xfrm>
-            <a:off x="2700000" y="2700000"/>
-            <a:ext cx="4679640" cy="2159640"/>
+            <a:off x="504000" y="301320"/>
+            <a:ext cx="9072000" cy="1261800"/>
           </a:xfrm>
           <a:prstGeom prst="rect">
             <a:avLst/>
@@ -2784,8 +2784,8 @@
         </p:nvSpPr>
         <p:spPr>
           <a:xfrm>
-            <a:off x="3420000" y="5040000"/>
-            <a:ext cx="3074040" cy="1029960"/>
+            <a:off x="504000" y="1768680"/>
+            <a:ext cx="4426920" cy="2090880"/>
           </a:xfrm>
           <a:prstGeom prst="rect">
             <a:avLst/>
@@ -2814,8 +2814,8 @@
         </p:nvSpPr>
         <p:spPr>
           <a:xfrm>
-            <a:off x="6648120" y="5040000"/>
-            <a:ext cx="3074040" cy="1029960"/>
+            <a:off x="5152680" y="1768680"/>
+            <a:ext cx="4426920" cy="2090880"/>
           </a:xfrm>
           <a:prstGeom prst="rect">
             <a:avLst/>
@@ -2844,8 +2844,8 @@
         </p:nvSpPr>
         <p:spPr>
           <a:xfrm>
-            <a:off x="3420000" y="6168240"/>
-            <a:ext cx="6299640" cy="1029960"/>
+            <a:off x="504000" y="4058640"/>
+            <a:ext cx="9072000" cy="2090880"/>
           </a:xfrm>
           <a:prstGeom prst="rect">
             <a:avLst/>
@@ -2896,8 +2896,8 @@
         </p:nvSpPr>
         <p:spPr>
           <a:xfrm>
-            <a:off x="2700000" y="2700000"/>
-            <a:ext cx="4679640" cy="2159640"/>
+            <a:off x="504000" y="301320"/>
+            <a:ext cx="9072000" cy="1261800"/>
           </a:xfrm>
           <a:prstGeom prst="rect">
             <a:avLst/>
@@ -2925,8 +2925,8 @@
         </p:nvSpPr>
         <p:spPr>
           <a:xfrm>
-            <a:off x="3420000" y="5040000"/>
-            <a:ext cx="6299640" cy="1029960"/>
+            <a:off x="504000" y="1768680"/>
+            <a:ext cx="9072000" cy="2090880"/>
           </a:xfrm>
           <a:prstGeom prst="rect">
             <a:avLst/>
@@ -2955,8 +2955,8 @@
         </p:nvSpPr>
         <p:spPr>
           <a:xfrm>
-            <a:off x="3420000" y="6168240"/>
-            <a:ext cx="6299640" cy="1029960"/>
+            <a:off x="504000" y="4058640"/>
+            <a:ext cx="9072000" cy="2090880"/>
           </a:xfrm>
           <a:prstGeom prst="rect">
             <a:avLst/>
@@ -3007,8 +3007,8 @@
         </p:nvSpPr>
         <p:spPr>
           <a:xfrm>
-            <a:off x="2700000" y="2700000"/>
-            <a:ext cx="4679640" cy="2159640"/>
+            <a:off x="504000" y="301320"/>
+            <a:ext cx="9072000" cy="1261800"/>
           </a:xfrm>
           <a:prstGeom prst="rect">
             <a:avLst/>
@@ -3036,8 +3036,8 @@
         </p:nvSpPr>
         <p:spPr>
           <a:xfrm>
-            <a:off x="3420000" y="5040000"/>
-            <a:ext cx="3074040" cy="1029960"/>
+            <a:off x="504000" y="1768680"/>
+            <a:ext cx="4426920" cy="2090880"/>
           </a:xfrm>
           <a:prstGeom prst="rect">
             <a:avLst/>
@@ -3066,8 +3066,8 @@
         </p:nvSpPr>
         <p:spPr>
           <a:xfrm>
-            <a:off x="6648120" y="5040000"/>
-            <a:ext cx="3074040" cy="1029960"/>
+            <a:off x="5152680" y="1768680"/>
+            <a:ext cx="4426920" cy="2090880"/>
           </a:xfrm>
           <a:prstGeom prst="rect">
             <a:avLst/>
@@ -3096,8 +3096,8 @@
         </p:nvSpPr>
         <p:spPr>
           <a:xfrm>
-            <a:off x="6648120" y="6168240"/>
-            <a:ext cx="3074040" cy="1029960"/>
+            <a:off x="5152680" y="4058640"/>
+            <a:ext cx="4426920" cy="2090880"/>
           </a:xfrm>
           <a:prstGeom prst="rect">
             <a:avLst/>
@@ -3126,8 +3126,8 @@
         </p:nvSpPr>
         <p:spPr>
           <a:xfrm>
-            <a:off x="3420000" y="6168240"/>
-            <a:ext cx="3074040" cy="1029960"/>
+            <a:off x="504000" y="4058640"/>
+            <a:ext cx="4426920" cy="2090880"/>
           </a:xfrm>
           <a:prstGeom prst="rect">
             <a:avLst/>
@@ -3178,8 +3178,8 @@
         </p:nvSpPr>
         <p:spPr>
           <a:xfrm>
-            <a:off x="2700000" y="2700000"/>
-            <a:ext cx="4679640" cy="2159640"/>
+            <a:off x="504000" y="301320"/>
+            <a:ext cx="9072000" cy="1261800"/>
           </a:xfrm>
           <a:prstGeom prst="rect">
             <a:avLst/>
@@ -3207,8 +3207,8 @@
         </p:nvSpPr>
         <p:spPr>
           <a:xfrm>
-            <a:off x="3420000" y="5040000"/>
-            <a:ext cx="2028240" cy="1029960"/>
+            <a:off x="504000" y="1768680"/>
+            <a:ext cx="2921040" cy="2090880"/>
           </a:xfrm>
           <a:prstGeom prst="rect">
             <a:avLst/>
@@ -3237,8 +3237,8 @@
         </p:nvSpPr>
         <p:spPr>
           <a:xfrm>
-            <a:off x="5550120" y="5040000"/>
-            <a:ext cx="2028240" cy="1029960"/>
+            <a:off x="3571560" y="1768680"/>
+            <a:ext cx="2921040" cy="2090880"/>
           </a:xfrm>
           <a:prstGeom prst="rect">
             <a:avLst/>
@@ -3267,8 +3267,8 @@
         </p:nvSpPr>
         <p:spPr>
           <a:xfrm>
-            <a:off x="7680240" y="5040000"/>
-            <a:ext cx="2028240" cy="1029960"/>
+            <a:off x="6639120" y="1768680"/>
+            <a:ext cx="2921040" cy="2090880"/>
           </a:xfrm>
           <a:prstGeom prst="rect">
             <a:avLst/>
@@ -3297,8 +3297,8 @@
         </p:nvSpPr>
         <p:spPr>
           <a:xfrm>
-            <a:off x="7680240" y="6168240"/>
-            <a:ext cx="2028240" cy="1029960"/>
+            <a:off x="6639120" y="4058640"/>
+            <a:ext cx="2921040" cy="2090880"/>
           </a:xfrm>
           <a:prstGeom prst="rect">
             <a:avLst/>
@@ -3327,8 +3327,8 @@
         </p:nvSpPr>
         <p:spPr>
           <a:xfrm>
-            <a:off x="5550120" y="6168240"/>
-            <a:ext cx="2028240" cy="1029960"/>
+            <a:off x="3571560" y="4058640"/>
+            <a:ext cx="2921040" cy="2090880"/>
           </a:xfrm>
           <a:prstGeom prst="rect">
             <a:avLst/>
@@ -3357,8 +3357,8 @@
         </p:nvSpPr>
         <p:spPr>
           <a:xfrm>
-            <a:off x="3420000" y="6168240"/>
-            <a:ext cx="2028240" cy="1029960"/>
+            <a:off x="504000" y="4058640"/>
+            <a:ext cx="2921040" cy="2090880"/>
           </a:xfrm>
           <a:prstGeom prst="rect">
             <a:avLst/>
@@ -3409,8 +3409,8 @@
         </p:nvSpPr>
         <p:spPr>
           <a:xfrm>
-            <a:off x="2700000" y="2700000"/>
-            <a:ext cx="4679640" cy="2159640"/>
+            <a:off x="504000" y="301320"/>
+            <a:ext cx="9072000" cy="1261800"/>
           </a:xfrm>
           <a:prstGeom prst="rect">
             <a:avLst/>
@@ -3438,8 +3438,8 @@
         </p:nvSpPr>
         <p:spPr>
           <a:xfrm>
-            <a:off x="3420000" y="5040000"/>
-            <a:ext cx="3074040" cy="2159640"/>
+            <a:off x="504000" y="1768680"/>
+            <a:ext cx="4426920" cy="4384080"/>
           </a:xfrm>
           <a:prstGeom prst="rect">
             <a:avLst/>
@@ -3468,8 +3468,8 @@
         </p:nvSpPr>
         <p:spPr>
           <a:xfrm>
-            <a:off x="6648120" y="5040000"/>
-            <a:ext cx="3074040" cy="2159640"/>
+            <a:off x="5152680" y="1768680"/>
+            <a:ext cx="4426920" cy="4384080"/>
           </a:xfrm>
           <a:prstGeom prst="rect">
             <a:avLst/>
@@ -3520,8 +3520,8 @@
         </p:nvSpPr>
         <p:spPr>
           <a:xfrm>
-            <a:off x="2700000" y="2700000"/>
-            <a:ext cx="4679640" cy="2159640"/>
+            <a:off x="504000" y="301320"/>
+            <a:ext cx="9072000" cy="1261800"/>
           </a:xfrm>
           <a:prstGeom prst="rect">
             <a:avLst/>
@@ -3571,8 +3571,8 @@
         </p:nvSpPr>
         <p:spPr>
           <a:xfrm>
-            <a:off x="2700000" y="2700000"/>
-            <a:ext cx="4679640" cy="10011960"/>
+            <a:off x="504000" y="301320"/>
+            <a:ext cx="9072000" cy="5850360"/>
           </a:xfrm>
           <a:prstGeom prst="rect">
             <a:avLst/>
@@ -3622,8 +3622,8 @@
         </p:nvSpPr>
         <p:spPr>
           <a:xfrm>
-            <a:off x="2700000" y="2700000"/>
-            <a:ext cx="4679640" cy="2159640"/>
+            <a:off x="504000" y="301320"/>
+            <a:ext cx="9072000" cy="1261800"/>
           </a:xfrm>
           <a:prstGeom prst="rect">
             <a:avLst/>
@@ -3651,8 +3651,8 @@
         </p:nvSpPr>
         <p:spPr>
           <a:xfrm>
-            <a:off x="3420000" y="5040000"/>
-            <a:ext cx="3074040" cy="1029960"/>
+            <a:off x="504000" y="1768680"/>
+            <a:ext cx="4426920" cy="2090880"/>
           </a:xfrm>
           <a:prstGeom prst="rect">
             <a:avLst/>
@@ -3681,8 +3681,8 @@
         </p:nvSpPr>
         <p:spPr>
           <a:xfrm>
-            <a:off x="3420000" y="6168240"/>
-            <a:ext cx="3074040" cy="1029960"/>
+            <a:off x="504000" y="4058640"/>
+            <a:ext cx="4426920" cy="2090880"/>
           </a:xfrm>
           <a:prstGeom prst="rect">
             <a:avLst/>
@@ -3711,8 +3711,8 @@
         </p:nvSpPr>
         <p:spPr>
           <a:xfrm>
-            <a:off x="6648120" y="5040000"/>
-            <a:ext cx="3074040" cy="2159640"/>
+            <a:off x="5152680" y="1768680"/>
+            <a:ext cx="4426920" cy="4384080"/>
           </a:xfrm>
           <a:prstGeom prst="rect">
             <a:avLst/>
@@ -3763,8 +3763,8 @@
         </p:nvSpPr>
         <p:spPr>
           <a:xfrm>
-            <a:off x="2700000" y="2700000"/>
-            <a:ext cx="4679640" cy="2159640"/>
+            <a:off x="504000" y="301320"/>
+            <a:ext cx="9072000" cy="1261800"/>
           </a:xfrm>
           <a:prstGeom prst="rect">
             <a:avLst/>
@@ -3792,8 +3792,8 @@
         </p:nvSpPr>
         <p:spPr>
           <a:xfrm>
-            <a:off x="3420000" y="5040000"/>
-            <a:ext cx="3074040" cy="2159640"/>
+            <a:off x="504000" y="1768680"/>
+            <a:ext cx="4426920" cy="4384080"/>
           </a:xfrm>
           <a:prstGeom prst="rect">
             <a:avLst/>
@@ -3822,8 +3822,8 @@
         </p:nvSpPr>
         <p:spPr>
           <a:xfrm>
-            <a:off x="6648120" y="5040000"/>
-            <a:ext cx="3074040" cy="1029960"/>
+            <a:off x="5152680" y="1768680"/>
+            <a:ext cx="4426920" cy="2090880"/>
           </a:xfrm>
           <a:prstGeom prst="rect">
             <a:avLst/>
@@ -3852,8 +3852,8 @@
         </p:nvSpPr>
         <p:spPr>
           <a:xfrm>
-            <a:off x="6648120" y="6168240"/>
-            <a:ext cx="3074040" cy="1029960"/>
+            <a:off x="5152680" y="4058640"/>
+            <a:ext cx="4426920" cy="2090880"/>
           </a:xfrm>
           <a:prstGeom prst="rect">
             <a:avLst/>
@@ -3904,8 +3904,8 @@
         </p:nvSpPr>
         <p:spPr>
           <a:xfrm>
-            <a:off x="2700000" y="2700000"/>
-            <a:ext cx="4679640" cy="2159640"/>
+            <a:off x="504000" y="301320"/>
+            <a:ext cx="9072000" cy="1261800"/>
           </a:xfrm>
           <a:prstGeom prst="rect">
             <a:avLst/>
@@ -3933,8 +3933,8 @@
         </p:nvSpPr>
         <p:spPr>
           <a:xfrm>
-            <a:off x="3420000" y="5040000"/>
-            <a:ext cx="3074040" cy="1029960"/>
+            <a:off x="504000" y="1768680"/>
+            <a:ext cx="4426920" cy="2090880"/>
           </a:xfrm>
           <a:prstGeom prst="rect">
             <a:avLst/>
@@ -3963,8 +3963,8 @@
         </p:nvSpPr>
         <p:spPr>
           <a:xfrm>
-            <a:off x="6648120" y="5040000"/>
-            <a:ext cx="3074040" cy="1029960"/>
+            <a:off x="5152680" y="1768680"/>
+            <a:ext cx="4426920" cy="2090880"/>
           </a:xfrm>
           <a:prstGeom prst="rect">
             <a:avLst/>
@@ -3993,8 +3993,8 @@
         </p:nvSpPr>
         <p:spPr>
           <a:xfrm>
-            <a:off x="3420000" y="6168240"/>
-            <a:ext cx="6299640" cy="1029960"/>
+            <a:off x="504000" y="4058640"/>
+            <a:ext cx="9072000" cy="2090880"/>
           </a:xfrm>
           <a:prstGeom prst="rect">
             <a:avLst/>
@@ -4049,7 +4049,7 @@
         <p:spPr>
           <a:xfrm>
             <a:off x="0" y="0"/>
-            <a:ext cx="10079640" cy="5039640"/>
+            <a:ext cx="10079280" cy="5039280"/>
           </a:xfrm>
           <a:prstGeom prst="rect">
             <a:avLst/>
@@ -4081,7 +4081,7 @@
         <p:spPr>
           <a:xfrm>
             <a:off x="2700000" y="2700000"/>
-            <a:ext cx="4679640" cy="2159640"/>
+            <a:ext cx="4679280" cy="2159280"/>
           </a:xfrm>
           <a:prstGeom prst="rect">
             <a:avLst/>
@@ -4114,8 +4114,8 @@
         </p:nvSpPr>
         <p:spPr>
           <a:xfrm>
-            <a:off x="504000" y="1768680"/>
-            <a:ext cx="9072000" cy="4384080"/>
+            <a:off x="3420000" y="5040000"/>
+            <a:ext cx="6299280" cy="2159280"/>
           </a:xfrm>
           <a:prstGeom prst="rect">
             <a:avLst/>
@@ -4138,12 +4138,12 @@
               <a:buChar char=""/>
             </a:pPr>
             <a:r>
-              <a:rPr b="0" lang="en-IN" sz="3200" spc="-1" strike="noStrike">
+              <a:rPr b="0" lang="en-IN" sz="1800" spc="-1" strike="noStrike">
                 <a:latin typeface="Arial"/>
               </a:rPr>
               <a:t>Click to edit the outline text format</a:t>
             </a:r>
-            <a:endParaRPr b="0" lang="en-IN" sz="3200" spc="-1" strike="noStrike">
+            <a:endParaRPr b="0" lang="en-IN" sz="1800" spc="-1" strike="noStrike">
               <a:latin typeface="Arial"/>
             </a:endParaRPr>
           </a:p>
@@ -4160,12 +4160,12 @@
               <a:buChar char=""/>
             </a:pPr>
             <a:r>
-              <a:rPr b="0" lang="en-IN" sz="2800" spc="-1" strike="noStrike">
+              <a:rPr b="0" lang="en-IN" sz="1800" spc="-1" strike="noStrike">
                 <a:latin typeface="Arial"/>
               </a:rPr>
               <a:t>Second Outline Level</a:t>
             </a:r>
-            <a:endParaRPr b="0" lang="en-IN" sz="2800" spc="-1" strike="noStrike">
+            <a:endParaRPr b="0" lang="en-IN" sz="1800" spc="-1" strike="noStrike">
               <a:latin typeface="Arial"/>
             </a:endParaRPr>
           </a:p>
@@ -4182,12 +4182,12 @@
               <a:buChar char=""/>
             </a:pPr>
             <a:r>
-              <a:rPr b="0" lang="en-IN" sz="2400" spc="-1" strike="noStrike">
+              <a:rPr b="0" lang="en-IN" sz="1800" spc="-1" strike="noStrike">
                 <a:latin typeface="Arial"/>
               </a:rPr>
               <a:t>Third Outline Level</a:t>
             </a:r>
-            <a:endParaRPr b="0" lang="en-IN" sz="2400" spc="-1" strike="noStrike">
+            <a:endParaRPr b="0" lang="en-IN" sz="1800" spc="-1" strike="noStrike">
               <a:latin typeface="Arial"/>
             </a:endParaRPr>
           </a:p>
@@ -4204,12 +4204,12 @@
               <a:buChar char=""/>
             </a:pPr>
             <a:r>
-              <a:rPr b="0" lang="en-IN" sz="2000" spc="-1" strike="noStrike">
+              <a:rPr b="0" lang="en-IN" sz="1800" spc="-1" strike="noStrike">
                 <a:latin typeface="Arial"/>
               </a:rPr>
               <a:t>Fourth Outline Level</a:t>
             </a:r>
-            <a:endParaRPr b="0" lang="en-IN" sz="2000" spc="-1" strike="noStrike">
+            <a:endParaRPr b="0" lang="en-IN" sz="1800" spc="-1" strike="noStrike">
               <a:latin typeface="Arial"/>
             </a:endParaRPr>
           </a:p>
@@ -4226,12 +4226,12 @@
               <a:buChar char=""/>
             </a:pPr>
             <a:r>
-              <a:rPr b="0" lang="en-IN" sz="2000" spc="-1" strike="noStrike">
+              <a:rPr b="0" lang="en-IN" sz="1800" spc="-1" strike="noStrike">
                 <a:latin typeface="Arial"/>
               </a:rPr>
               <a:t>Fifth Outline Level</a:t>
             </a:r>
-            <a:endParaRPr b="0" lang="en-IN" sz="2000" spc="-1" strike="noStrike">
+            <a:endParaRPr b="0" lang="en-IN" sz="1800" spc="-1" strike="noStrike">
               <a:latin typeface="Arial"/>
             </a:endParaRPr>
           </a:p>
@@ -4248,12 +4248,12 @@
               <a:buChar char=""/>
             </a:pPr>
             <a:r>
-              <a:rPr b="0" lang="en-IN" sz="2000" spc="-1" strike="noStrike">
+              <a:rPr b="0" lang="en-IN" sz="1800" spc="-1" strike="noStrike">
                 <a:latin typeface="Arial"/>
               </a:rPr>
               <a:t>Sixth Outline Level</a:t>
             </a:r>
-            <a:endParaRPr b="0" lang="en-IN" sz="2000" spc="-1" strike="noStrike">
+            <a:endParaRPr b="0" lang="en-IN" sz="1800" spc="-1" strike="noStrike">
               <a:latin typeface="Arial"/>
             </a:endParaRPr>
           </a:p>
@@ -4270,12 +4270,12 @@
               <a:buChar char=""/>
             </a:pPr>
             <a:r>
-              <a:rPr b="0" lang="en-IN" sz="2000" spc="-1" strike="noStrike">
+              <a:rPr b="0" lang="en-IN" sz="1800" spc="-1" strike="noStrike">
                 <a:latin typeface="Arial"/>
               </a:rPr>
               <a:t>Seventh Outline Level</a:t>
             </a:r>
-            <a:endParaRPr b="0" lang="en-IN" sz="2000" spc="-1" strike="noStrike">
+            <a:endParaRPr b="0" lang="en-IN" sz="1800" spc="-1" strike="noStrike">
               <a:latin typeface="Arial"/>
             </a:endParaRPr>
           </a:p>
@@ -4327,7 +4327,7 @@
         <p:spPr>
           <a:xfrm>
             <a:off x="0" y="7200000"/>
-            <a:ext cx="10079640" cy="359640"/>
+            <a:ext cx="10079280" cy="359280"/>
           </a:xfrm>
           <a:prstGeom prst="rect">
             <a:avLst/>
@@ -4355,7 +4355,7 @@
         <p:spPr>
           <a:xfrm>
             <a:off x="0" y="0"/>
-            <a:ext cx="10079640" cy="1619640"/>
+            <a:ext cx="10079280" cy="1619280"/>
           </a:xfrm>
           <a:prstGeom prst="rect">
             <a:avLst/>
@@ -4383,7 +4383,7 @@
         <p:spPr>
           <a:xfrm>
             <a:off x="9270000" y="6894000"/>
-            <a:ext cx="539640" cy="539640"/>
+            <a:ext cx="539280" cy="539280"/>
           </a:xfrm>
           <a:prstGeom prst="ellipse">
             <a:avLst/>
@@ -4414,23 +4414,24 @@
         </p:nvSpPr>
         <p:spPr>
           <a:xfrm>
-            <a:off x="2700000" y="2700000"/>
-            <a:ext cx="4679640" cy="2159640"/>
-          </a:xfrm>
-          <a:prstGeom prst="rect">
-            <a:avLst/>
-          </a:prstGeom>
-        </p:spPr>
-        <p:txBody>
-          <a:bodyPr lIns="0" rIns="0" tIns="0" bIns="0" anchor="ctr" anchorCtr="1"/>
-          <a:p>
+            <a:off x="504000" y="301320"/>
+            <a:ext cx="9072000" cy="1261800"/>
+          </a:xfrm>
+          <a:prstGeom prst="rect">
+            <a:avLst/>
+          </a:prstGeom>
+        </p:spPr>
+        <p:txBody>
+          <a:bodyPr lIns="0" rIns="0" tIns="0" bIns="0" anchor="ctr"/>
+          <a:p>
+            <a:pPr algn="ctr"/>
             <a:r>
-              <a:rPr b="0" lang="en-IN" sz="1800" spc="-1" strike="noStrike">
+              <a:rPr b="0" lang="en-IN" sz="4400" spc="-1" strike="noStrike">
                 <a:latin typeface="Arial"/>
               </a:rPr>
               <a:t>Click to edit the title text format</a:t>
             </a:r>
-            <a:endParaRPr b="0" lang="en-IN" sz="1800" spc="-1" strike="noStrike">
+            <a:endParaRPr b="0" lang="en-IN" sz="4400" spc="-1" strike="noStrike">
               <a:latin typeface="Arial"/>
             </a:endParaRPr>
           </a:p>
@@ -4448,8 +4449,8 @@
         </p:nvSpPr>
         <p:spPr>
           <a:xfrm>
-            <a:off x="3420000" y="5040000"/>
-            <a:ext cx="6299640" cy="2159640"/>
+            <a:off x="504000" y="1768680"/>
+            <a:ext cx="9072000" cy="4384080"/>
           </a:xfrm>
           <a:prstGeom prst="rect">
             <a:avLst/>
@@ -4472,12 +4473,12 @@
               <a:buChar char=""/>
             </a:pPr>
             <a:r>
-              <a:rPr b="0" lang="en-IN" sz="1800" spc="-1" strike="noStrike">
+              <a:rPr b="0" lang="en-IN" sz="3200" spc="-1" strike="noStrike">
                 <a:latin typeface="Arial"/>
               </a:rPr>
               <a:t>Click to edit the outline text format</a:t>
             </a:r>
-            <a:endParaRPr b="0" lang="en-IN" sz="1800" spc="-1" strike="noStrike">
+            <a:endParaRPr b="0" lang="en-IN" sz="3200" spc="-1" strike="noStrike">
               <a:latin typeface="Arial"/>
             </a:endParaRPr>
           </a:p>
@@ -4494,12 +4495,12 @@
               <a:buChar char=""/>
             </a:pPr>
             <a:r>
-              <a:rPr b="0" lang="en-IN" sz="1800" spc="-1" strike="noStrike">
+              <a:rPr b="0" lang="en-IN" sz="2800" spc="-1" strike="noStrike">
                 <a:latin typeface="Arial"/>
               </a:rPr>
               <a:t>Second Outline Level</a:t>
             </a:r>
-            <a:endParaRPr b="0" lang="en-IN" sz="1800" spc="-1" strike="noStrike">
+            <a:endParaRPr b="0" lang="en-IN" sz="2800" spc="-1" strike="noStrike">
               <a:latin typeface="Arial"/>
             </a:endParaRPr>
           </a:p>
@@ -4516,12 +4517,12 @@
               <a:buChar char=""/>
             </a:pPr>
             <a:r>
-              <a:rPr b="0" lang="en-IN" sz="1800" spc="-1" strike="noStrike">
+              <a:rPr b="0" lang="en-IN" sz="2400" spc="-1" strike="noStrike">
                 <a:latin typeface="Arial"/>
               </a:rPr>
               <a:t>Third Outline Level</a:t>
             </a:r>
-            <a:endParaRPr b="0" lang="en-IN" sz="1800" spc="-1" strike="noStrike">
+            <a:endParaRPr b="0" lang="en-IN" sz="2400" spc="-1" strike="noStrike">
               <a:latin typeface="Arial"/>
             </a:endParaRPr>
           </a:p>
@@ -4538,12 +4539,12 @@
               <a:buChar char=""/>
             </a:pPr>
             <a:r>
-              <a:rPr b="0" lang="en-IN" sz="1800" spc="-1" strike="noStrike">
+              <a:rPr b="0" lang="en-IN" sz="2000" spc="-1" strike="noStrike">
                 <a:latin typeface="Arial"/>
               </a:rPr>
               <a:t>Fourth Outline Level</a:t>
             </a:r>
-            <a:endParaRPr b="0" lang="en-IN" sz="1800" spc="-1" strike="noStrike">
+            <a:endParaRPr b="0" lang="en-IN" sz="2000" spc="-1" strike="noStrike">
               <a:latin typeface="Arial"/>
             </a:endParaRPr>
           </a:p>
@@ -4560,12 +4561,12 @@
               <a:buChar char=""/>
             </a:pPr>
             <a:r>
-              <a:rPr b="0" lang="en-IN" sz="1800" spc="-1" strike="noStrike">
+              <a:rPr b="0" lang="en-IN" sz="2000" spc="-1" strike="noStrike">
                 <a:latin typeface="Arial"/>
               </a:rPr>
               <a:t>Fifth Outline Level</a:t>
             </a:r>
-            <a:endParaRPr b="0" lang="en-IN" sz="1800" spc="-1" strike="noStrike">
+            <a:endParaRPr b="0" lang="en-IN" sz="2000" spc="-1" strike="noStrike">
               <a:latin typeface="Arial"/>
             </a:endParaRPr>
           </a:p>
@@ -4582,12 +4583,12 @@
               <a:buChar char=""/>
             </a:pPr>
             <a:r>
-              <a:rPr b="0" lang="en-IN" sz="1800" spc="-1" strike="noStrike">
+              <a:rPr b="0" lang="en-IN" sz="2000" spc="-1" strike="noStrike">
                 <a:latin typeface="Arial"/>
               </a:rPr>
               <a:t>Sixth Outline Level</a:t>
             </a:r>
-            <a:endParaRPr b="0" lang="en-IN" sz="1800" spc="-1" strike="noStrike">
+            <a:endParaRPr b="0" lang="en-IN" sz="2000" spc="-1" strike="noStrike">
               <a:latin typeface="Arial"/>
             </a:endParaRPr>
           </a:p>
@@ -4604,12 +4605,12 @@
               <a:buChar char=""/>
             </a:pPr>
             <a:r>
-              <a:rPr b="0" lang="en-IN" sz="1800" spc="-1" strike="noStrike">
+              <a:rPr b="0" lang="en-IN" sz="2000" spc="-1" strike="noStrike">
                 <a:latin typeface="Arial"/>
               </a:rPr>
               <a:t>Seventh Outline Level</a:t>
             </a:r>
-            <a:endParaRPr b="0" lang="en-IN" sz="1800" spc="-1" strike="noStrike">
+            <a:endParaRPr b="0" lang="en-IN" sz="2000" spc="-1" strike="noStrike">
               <a:latin typeface="Arial"/>
             </a:endParaRPr>
           </a:p>
@@ -4668,7 +4669,7 @@
         <p:spPr>
           <a:xfrm>
             <a:off x="2520000" y="2520000"/>
-            <a:ext cx="5039640" cy="2519640"/>
+            <a:ext cx="5039280" cy="2519280"/>
           </a:xfrm>
           <a:prstGeom prst="wedgeRectCallout">
             <a:avLst>
@@ -4702,23 +4703,24 @@
         </p:nvSpPr>
         <p:spPr>
           <a:xfrm>
-            <a:off x="2700000" y="2700000"/>
-            <a:ext cx="4679640" cy="2159640"/>
-          </a:xfrm>
-          <a:prstGeom prst="rect">
-            <a:avLst/>
-          </a:prstGeom>
-        </p:spPr>
-        <p:txBody>
-          <a:bodyPr lIns="0" rIns="0" tIns="0" bIns="0" anchor="ctr" anchorCtr="1"/>
-          <a:p>
+            <a:off x="504000" y="301320"/>
+            <a:ext cx="9072000" cy="1261800"/>
+          </a:xfrm>
+          <a:prstGeom prst="rect">
+            <a:avLst/>
+          </a:prstGeom>
+        </p:spPr>
+        <p:txBody>
+          <a:bodyPr lIns="0" rIns="0" tIns="0" bIns="0" anchor="ctr"/>
+          <a:p>
+            <a:pPr algn="ctr"/>
             <a:r>
-              <a:rPr b="0" lang="en-IN" sz="1800" spc="-1" strike="noStrike">
+              <a:rPr b="0" lang="en-IN" sz="4400" spc="-1" strike="noStrike">
                 <a:latin typeface="Arial"/>
               </a:rPr>
               <a:t>Click to edit the title text format</a:t>
             </a:r>
-            <a:endParaRPr b="0" lang="en-IN" sz="1800" spc="-1" strike="noStrike">
+            <a:endParaRPr b="0" lang="en-IN" sz="4400" spc="-1" strike="noStrike">
               <a:latin typeface="Arial"/>
             </a:endParaRPr>
           </a:p>
@@ -4736,8 +4738,8 @@
         </p:nvSpPr>
         <p:spPr>
           <a:xfrm>
-            <a:off x="3420000" y="5040000"/>
-            <a:ext cx="6299640" cy="2159640"/>
+            <a:off x="504000" y="1768680"/>
+            <a:ext cx="9072000" cy="4384080"/>
           </a:xfrm>
           <a:prstGeom prst="rect">
             <a:avLst/>
@@ -4760,12 +4762,12 @@
               <a:buChar char=""/>
             </a:pPr>
             <a:r>
-              <a:rPr b="0" lang="en-IN" sz="1800" spc="-1" strike="noStrike">
+              <a:rPr b="0" lang="en-IN" sz="3200" spc="-1" strike="noStrike">
                 <a:latin typeface="Arial"/>
               </a:rPr>
               <a:t>Click to edit the outline text format</a:t>
             </a:r>
-            <a:endParaRPr b="0" lang="en-IN" sz="1800" spc="-1" strike="noStrike">
+            <a:endParaRPr b="0" lang="en-IN" sz="3200" spc="-1" strike="noStrike">
               <a:latin typeface="Arial"/>
             </a:endParaRPr>
           </a:p>
@@ -4782,12 +4784,12 @@
               <a:buChar char=""/>
             </a:pPr>
             <a:r>
-              <a:rPr b="0" lang="en-IN" sz="1800" spc="-1" strike="noStrike">
+              <a:rPr b="0" lang="en-IN" sz="2800" spc="-1" strike="noStrike">
                 <a:latin typeface="Arial"/>
               </a:rPr>
               <a:t>Second Outline Level</a:t>
             </a:r>
-            <a:endParaRPr b="0" lang="en-IN" sz="1800" spc="-1" strike="noStrike">
+            <a:endParaRPr b="0" lang="en-IN" sz="2800" spc="-1" strike="noStrike">
               <a:latin typeface="Arial"/>
             </a:endParaRPr>
           </a:p>
@@ -4804,12 +4806,12 @@
               <a:buChar char=""/>
             </a:pPr>
             <a:r>
-              <a:rPr b="0" lang="en-IN" sz="1800" spc="-1" strike="noStrike">
+              <a:rPr b="0" lang="en-IN" sz="2400" spc="-1" strike="noStrike">
                 <a:latin typeface="Arial"/>
               </a:rPr>
               <a:t>Third Outline Level</a:t>
             </a:r>
-            <a:endParaRPr b="0" lang="en-IN" sz="1800" spc="-1" strike="noStrike">
+            <a:endParaRPr b="0" lang="en-IN" sz="2400" spc="-1" strike="noStrike">
               <a:latin typeface="Arial"/>
             </a:endParaRPr>
           </a:p>
@@ -4826,12 +4828,12 @@
               <a:buChar char=""/>
             </a:pPr>
             <a:r>
-              <a:rPr b="0" lang="en-IN" sz="1800" spc="-1" strike="noStrike">
+              <a:rPr b="0" lang="en-IN" sz="2000" spc="-1" strike="noStrike">
                 <a:latin typeface="Arial"/>
               </a:rPr>
               <a:t>Fourth Outline Level</a:t>
             </a:r>
-            <a:endParaRPr b="0" lang="en-IN" sz="1800" spc="-1" strike="noStrike">
+            <a:endParaRPr b="0" lang="en-IN" sz="2000" spc="-1" strike="noStrike">
               <a:latin typeface="Arial"/>
             </a:endParaRPr>
           </a:p>
@@ -4848,12 +4850,12 @@
               <a:buChar char=""/>
             </a:pPr>
             <a:r>
-              <a:rPr b="0" lang="en-IN" sz="1800" spc="-1" strike="noStrike">
+              <a:rPr b="0" lang="en-IN" sz="2000" spc="-1" strike="noStrike">
                 <a:latin typeface="Arial"/>
               </a:rPr>
               <a:t>Fifth Outline Level</a:t>
             </a:r>
-            <a:endParaRPr b="0" lang="en-IN" sz="1800" spc="-1" strike="noStrike">
+            <a:endParaRPr b="0" lang="en-IN" sz="2000" spc="-1" strike="noStrike">
               <a:latin typeface="Arial"/>
             </a:endParaRPr>
           </a:p>
@@ -4870,12 +4872,12 @@
               <a:buChar char=""/>
             </a:pPr>
             <a:r>
-              <a:rPr b="0" lang="en-IN" sz="1800" spc="-1" strike="noStrike">
+              <a:rPr b="0" lang="en-IN" sz="2000" spc="-1" strike="noStrike">
                 <a:latin typeface="Arial"/>
               </a:rPr>
               <a:t>Sixth Outline Level</a:t>
             </a:r>
-            <a:endParaRPr b="0" lang="en-IN" sz="1800" spc="-1" strike="noStrike">
+            <a:endParaRPr b="0" lang="en-IN" sz="2000" spc="-1" strike="noStrike">
               <a:latin typeface="Arial"/>
             </a:endParaRPr>
           </a:p>
@@ -4892,12 +4894,12 @@
               <a:buChar char=""/>
             </a:pPr>
             <a:r>
-              <a:rPr b="0" lang="en-IN" sz="1800" spc="-1" strike="noStrike">
+              <a:rPr b="0" lang="en-IN" sz="2000" spc="-1" strike="noStrike">
                 <a:latin typeface="Arial"/>
               </a:rPr>
               <a:t>Seventh Outline Level</a:t>
             </a:r>
-            <a:endParaRPr b="0" lang="en-IN" sz="1800" spc="-1" strike="noStrike">
+            <a:endParaRPr b="0" lang="en-IN" sz="2000" spc="-1" strike="noStrike">
               <a:latin typeface="Arial"/>
             </a:endParaRPr>
           </a:p>
@@ -4949,7 +4951,7 @@
         <p:spPr>
           <a:xfrm>
             <a:off x="360000" y="3780000"/>
-            <a:ext cx="9359640" cy="958320"/>
+            <a:ext cx="9359280" cy="957960"/>
           </a:xfrm>
           <a:prstGeom prst="rect">
             <a:avLst/>
@@ -4979,6 +4981,7 @@
                   <a:srgbClr val="ffffff"/>
                 </a:solidFill>
                 <a:latin typeface="Roboto"/>
+                <a:ea typeface="DejaVu Sans"/>
               </a:rPr>
               <a:t>Peer to Peer Technology</a:t>
             </a:r>
@@ -4997,7 +5000,7 @@
         <p:spPr>
           <a:xfrm>
             <a:off x="360000" y="5220000"/>
-            <a:ext cx="9359640" cy="1979640"/>
+            <a:ext cx="9359280" cy="1979280"/>
           </a:xfrm>
           <a:prstGeom prst="rect">
             <a:avLst/>
@@ -5047,7 +5050,7 @@
                                   <p:childTnLst>
                                     <p:set>
                                       <p:cBhvr>
-                                        <p:cTn id="6" dur="0" fill="hold">
+                                        <p:cTn id="6" fill="hold">
                                           <p:stCondLst>
                                             <p:cond delay="0"/>
                                           </p:stCondLst>
@@ -5139,7 +5142,7 @@
         <p:spPr>
           <a:xfrm>
             <a:off x="360000" y="301320"/>
-            <a:ext cx="9359640" cy="958320"/>
+            <a:ext cx="9359280" cy="957960"/>
           </a:xfrm>
           <a:prstGeom prst="rect">
             <a:avLst/>
@@ -5169,6 +5172,7 @@
                   <a:srgbClr val="ffffff"/>
                 </a:solidFill>
                 <a:latin typeface="Roboto"/>
+                <a:ea typeface="DejaVu Sans"/>
               </a:rPr>
               <a:t>History</a:t>
             </a:r>
@@ -5187,7 +5191,7 @@
         <p:spPr>
           <a:xfrm>
             <a:off x="360000" y="1980000"/>
-            <a:ext cx="9359640" cy="5039640"/>
+            <a:ext cx="9359280" cy="5039280"/>
           </a:xfrm>
           <a:prstGeom prst="rect">
             <a:avLst/>
@@ -5208,7 +5212,7 @@
             <a:normAutofit/>
           </a:bodyPr>
           <a:p>
-            <a:pPr marL="432000" indent="-323640">
+            <a:pPr marL="432000" indent="-323280">
               <a:lnSpc>
                 <a:spcPct val="100000"/>
               </a:lnSpc>
@@ -5228,6 +5232,7 @@
                   <a:srgbClr val="2c3e50"/>
                 </a:solidFill>
                 <a:latin typeface="Source Sans Pro Semibold"/>
+                <a:ea typeface="DejaVu Sans"/>
               </a:rPr>
               <a:t>Before </a:t>
             </a:r>
@@ -5237,6 +5242,7 @@
                   <a:srgbClr val="2c3e50"/>
                 </a:solidFill>
                 <a:latin typeface="Source Sans Pro Semibold"/>
+                <a:ea typeface="DejaVu Sans"/>
               </a:rPr>
               <a:t>Peer to Peer (P2P)</a:t>
             </a:r>
@@ -5246,6 +5252,7 @@
                   <a:srgbClr val="2c3e50"/>
                 </a:solidFill>
                 <a:latin typeface="Source Sans Pro Semibold"/>
+                <a:ea typeface="DejaVu Sans"/>
               </a:rPr>
               <a:t> network was implemented, a more simple simple architecture was used in the form of </a:t>
             </a:r>
@@ -5255,6 +5262,7 @@
                   <a:srgbClr val="2c3e50"/>
                 </a:solidFill>
                 <a:latin typeface="Source Sans Pro Semibold"/>
+                <a:ea typeface="DejaVu Sans"/>
               </a:rPr>
               <a:t>Client Server</a:t>
             </a:r>
@@ -5264,6 +5272,7 @@
                   <a:srgbClr val="2c3e50"/>
                 </a:solidFill>
                 <a:latin typeface="Source Sans Pro Semibold"/>
+                <a:ea typeface="DejaVu Sans"/>
               </a:rPr>
               <a:t> architecture.</a:t>
             </a:r>
@@ -5272,7 +5281,7 @@
             </a:endParaRPr>
           </a:p>
           <a:p>
-            <a:pPr marL="432000" indent="-323640">
+            <a:pPr marL="432000" indent="-323280">
               <a:lnSpc>
                 <a:spcPct val="100000"/>
               </a:lnSpc>
@@ -5292,6 +5301,7 @@
                   <a:srgbClr val="2c3e50"/>
                 </a:solidFill>
                 <a:latin typeface="Source Sans Pro Semibold"/>
+                <a:ea typeface="DejaVu Sans"/>
               </a:rPr>
               <a:t>In this architecture multiple clients are connected to a server. The server component provides a function or service to one or many clients, which initiate requests for such services. </a:t>
             </a:r>
@@ -5300,7 +5310,7 @@
             </a:endParaRPr>
           </a:p>
           <a:p>
-            <a:pPr marL="432000" indent="-323640">
+            <a:pPr marL="432000" indent="-323280">
               <a:lnSpc>
                 <a:spcPct val="100000"/>
               </a:lnSpc>
@@ -5320,6 +5330,7 @@
                   <a:srgbClr val="2c3e50"/>
                 </a:solidFill>
                 <a:latin typeface="Source Sans Pro Semibold"/>
+                <a:ea typeface="DejaVu Sans"/>
               </a:rPr>
               <a:t>Eg: A web server serves web pages and a file server serves computer files</a:t>
             </a:r>
@@ -5341,19 +5352,13 @@
             </a:endParaRPr>
           </a:p>
           <a:p>
-            <a:pPr marL="432000" indent="-323640">
+            <a:pPr>
               <a:lnSpc>
                 <a:spcPct val="100000"/>
               </a:lnSpc>
               <a:spcAft>
                 <a:spcPts val="1414"/>
               </a:spcAft>
-              <a:buClr>
-                <a:srgbClr val="2c3e50"/>
-              </a:buClr>
-              <a:buSzPct val="45000"/>
-              <a:buFont typeface="Wingdings" charset="2"/>
-              <a:buChar char=""/>
             </a:pPr>
             <a:endParaRPr b="0" lang="en-IN" sz="2000" spc="-1" strike="noStrike">
               <a:latin typeface="Arial"/>
@@ -5374,7 +5379,7 @@
         <p:spPr>
           <a:xfrm>
             <a:off x="3240000" y="4608000"/>
-            <a:ext cx="3528000" cy="2116800"/>
+            <a:ext cx="3527640" cy="2116440"/>
           </a:xfrm>
           <a:prstGeom prst="rect">
             <a:avLst/>
@@ -5417,7 +5422,7 @@
                                   <p:childTnLst>
                                     <p:set>
                                       <p:cBhvr>
-                                        <p:cTn id="13" dur="0" fill="hold">
+                                        <p:cTn id="13" fill="hold">
                                           <p:stCondLst>
                                             <p:cond delay="0"/>
                                           </p:stCondLst>
@@ -5658,15 +5663,33 @@
                                   </p:childTnLst>
                                 </p:cTn>
                               </p:par>
+                            </p:childTnLst>
+                          </p:cTn>
+                        </p:par>
+                      </p:childTnLst>
+                    </p:cTn>
+                  </p:par>
+                  <p:par>
+                    <p:cTn id="27" fill="freeze">
+                      <p:stCondLst>
+                        <p:cond delay="indefinite"/>
+                      </p:stCondLst>
+                      <p:childTnLst>
+                        <p:par>
+                          <p:cTn id="28" fill="freeze">
+                            <p:stCondLst>
+                              <p:cond delay="0"/>
+                            </p:stCondLst>
+                            <p:childTnLst>
                               <p:par>
-                                <p:cTn id="27" nodeType="withEffect" fill="hold" presetClass="entr" presetID="2" presetSubtype="4">
+                                <p:cTn id="29" nodeType="clickEffect" fill="hold" presetClass="entr" presetID="2" presetSubtype="4">
                                   <p:stCondLst>
                                     <p:cond delay="0"/>
                                   </p:stCondLst>
                                   <p:childTnLst>
                                     <p:set>
                                       <p:cBhvr>
-                                        <p:cTn id="28" dur="2" fill="hold">
+                                        <p:cTn id="30" dur="1" fill="hold">
                                           <p:stCondLst>
                                             <p:cond delay="0"/>
                                           </p:stCondLst>
@@ -5688,7 +5711,7 @@
                                     </p:set>
                                     <p:anim calcmode="lin" valueType="num">
                                       <p:cBhvr additive="repl">
-                                        <p:cTn id="29" dur="1000" fill="hold"/>
+                                        <p:cTn id="31" dur="500" fill="hold"/>
                                         <p:tgtEl>
                                           <p:spTgt spid="122">
                                             <p:txEl>
@@ -5715,7 +5738,7 @@
                                     </p:anim>
                                     <p:anim calcmode="lin" valueType="num">
                                       <p:cBhvr additive="repl">
-                                        <p:cTn id="30" dur="1000" fill="hold"/>
+                                        <p:cTn id="32" dur="500" fill="hold"/>
                                         <p:tgtEl>
                                           <p:spTgt spid="122">
                                             <p:txEl>
@@ -5750,26 +5773,26 @@
                     </p:cTn>
                   </p:par>
                   <p:par>
-                    <p:cTn id="31" fill="freeze">
+                    <p:cTn id="33" fill="freeze">
                       <p:stCondLst>
                         <p:cond delay="indefinite"/>
                       </p:stCondLst>
                       <p:childTnLst>
                         <p:par>
-                          <p:cTn id="32" fill="freeze">
+                          <p:cTn id="34" fill="freeze">
                             <p:stCondLst>
                               <p:cond delay="0"/>
                             </p:stCondLst>
                             <p:childTnLst>
                               <p:par>
-                                <p:cTn id="33" nodeType="clickEffect" fill="hold" presetClass="entr" presetID="3" presetSubtype="10">
+                                <p:cTn id="35" nodeType="clickEffect" fill="hold" presetClass="entr" presetID="3" presetSubtype="10">
                                   <p:stCondLst>
                                     <p:cond delay="0"/>
                                   </p:stCondLst>
                                   <p:childTnLst>
                                     <p:set>
                                       <p:cBhvr>
-                                        <p:cTn id="34" dur="2" fill="hold">
+                                        <p:cTn id="36" dur="2" fill="hold">
                                           <p:stCondLst>
                                             <p:cond delay="0"/>
                                           </p:stCondLst>
@@ -5787,7 +5810,7 @@
                                     </p:set>
                                     <p:animEffect filter="blinds(horizontal)" transition="in">
                                       <p:cBhvr additive="repl">
-                                        <p:cTn id="35" dur="1000"/>
+                                        <p:cTn id="37" dur="1000"/>
                                         <p:tgtEl>
                                           <p:spTgt spid="123"/>
                                         </p:tgtEl>
@@ -5853,7 +5876,7 @@
         <p:spPr>
           <a:xfrm>
             <a:off x="360000" y="301320"/>
-            <a:ext cx="9359640" cy="958320"/>
+            <a:ext cx="9359280" cy="957960"/>
           </a:xfrm>
           <a:prstGeom prst="rect">
             <a:avLst/>
@@ -5883,6 +5906,7 @@
                   <a:srgbClr val="ffffff"/>
                 </a:solidFill>
                 <a:latin typeface="Roboto"/>
+                <a:ea typeface="DejaVu Sans"/>
               </a:rPr>
               <a:t>Disadvantages</a:t>
             </a:r>
@@ -5901,7 +5925,7 @@
         <p:spPr>
           <a:xfrm>
             <a:off x="360000" y="1980000"/>
-            <a:ext cx="9359640" cy="5039640"/>
+            <a:ext cx="9359280" cy="5039280"/>
           </a:xfrm>
           <a:prstGeom prst="rect">
             <a:avLst/>
@@ -5922,7 +5946,7 @@
             <a:normAutofit/>
           </a:bodyPr>
           <a:p>
-            <a:pPr marL="432000" indent="-323640">
+            <a:pPr marL="432000" indent="-323280">
               <a:lnSpc>
                 <a:spcPct val="100000"/>
               </a:lnSpc>
@@ -5942,6 +5966,7 @@
                   <a:srgbClr val="2c3e50"/>
                 </a:solidFill>
                 <a:latin typeface="Source Sans Pro Semibold"/>
+                <a:ea typeface="DejaVu Sans"/>
               </a:rPr>
               <a:t>Number of clients are much higher than servers.</a:t>
             </a:r>
@@ -5950,7 +5975,7 @@
             </a:endParaRPr>
           </a:p>
           <a:p>
-            <a:pPr marL="432000" indent="-323640">
+            <a:pPr marL="432000" indent="-323280">
               <a:lnSpc>
                 <a:spcPct val="100000"/>
               </a:lnSpc>
@@ -5970,6 +5995,7 @@
                   <a:srgbClr val="2c3e50"/>
                 </a:solidFill>
                 <a:latin typeface="Source Sans Pro Semibold"/>
+                <a:ea typeface="DejaVu Sans"/>
               </a:rPr>
               <a:t>High latency.</a:t>
             </a:r>
@@ -5978,7 +6004,7 @@
             </a:endParaRPr>
           </a:p>
           <a:p>
-            <a:pPr marL="432000" indent="-323640">
+            <a:pPr marL="432000" indent="-323280">
               <a:lnSpc>
                 <a:spcPct val="100000"/>
               </a:lnSpc>
@@ -5998,6 +6024,7 @@
                   <a:srgbClr val="2c3e50"/>
                 </a:solidFill>
                 <a:latin typeface="Source Sans Pro Semibold"/>
+                <a:ea typeface="DejaVu Sans"/>
               </a:rPr>
               <a:t>High work load on server.</a:t>
             </a:r>
@@ -6006,7 +6033,7 @@
             </a:endParaRPr>
           </a:p>
           <a:p>
-            <a:pPr marL="432000" indent="-323640">
+            <a:pPr marL="432000" indent="-323280">
               <a:lnSpc>
                 <a:spcPct val="100000"/>
               </a:lnSpc>
@@ -6026,6 +6053,7 @@
                   <a:srgbClr val="2c3e50"/>
                 </a:solidFill>
                 <a:latin typeface="Source Sans Pro Semibold"/>
+                <a:ea typeface="DejaVu Sans"/>
               </a:rPr>
               <a:t>Unable to serve large number of clients due to traffic congestion.</a:t>
             </a:r>
@@ -6043,10 +6071,10 @@
   <p:timing>
     <p:tnLst>
       <p:par>
-        <p:cTn id="36" dur="indefinite" restart="never" nodeType="tmRoot">
+        <p:cTn id="38" dur="indefinite" restart="never" nodeType="tmRoot">
           <p:childTnLst>
             <p:seq>
-              <p:cTn id="37" nodeType="mainSeq"/>
+              <p:cTn id="39" nodeType="mainSeq"/>
               <p:prevCondLst>
                 <p:cond delay="0" evt="onPrev">
                   <p:tgtEl>
@@ -6096,7 +6124,7 @@
         <p:spPr>
           <a:xfrm>
             <a:off x="360000" y="301320"/>
-            <a:ext cx="9359640" cy="958320"/>
+            <a:ext cx="9359280" cy="957960"/>
           </a:xfrm>
           <a:prstGeom prst="rect">
             <a:avLst/>
@@ -6126,6 +6154,7 @@
                   <a:srgbClr val="ffffff"/>
                 </a:solidFill>
                 <a:latin typeface="Roboto"/>
+                <a:ea typeface="DejaVu Sans"/>
               </a:rPr>
               <a:t>Solution?</a:t>
             </a:r>
@@ -6144,7 +6173,7 @@
         <p:spPr>
           <a:xfrm>
             <a:off x="360000" y="1980000"/>
-            <a:ext cx="9359640" cy="5039640"/>
+            <a:ext cx="9359280" cy="5039280"/>
           </a:xfrm>
           <a:prstGeom prst="rect">
             <a:avLst/>
@@ -6165,7 +6194,7 @@
             <a:normAutofit/>
           </a:bodyPr>
           <a:p>
-            <a:pPr marL="432000" indent="-323640" algn="ctr">
+            <a:pPr marL="432000" indent="-323280" algn="ctr">
               <a:lnSpc>
                 <a:spcPct val="100000"/>
               </a:lnSpc>
@@ -6185,6 +6214,7 @@
                   <a:srgbClr val="2c3e50"/>
                 </a:solidFill>
                 <a:latin typeface="Source Sans Pro Semibold"/>
+                <a:ea typeface="DejaVu Sans"/>
               </a:rPr>
               <a:t>Peer to Peer (P2P) Networking</a:t>
             </a:r>
@@ -6202,10 +6232,128 @@
   <p:timing>
     <p:tnLst>
       <p:par>
-        <p:cTn id="38" dur="indefinite" restart="never" nodeType="tmRoot">
+        <p:cTn id="40" dur="indefinite" restart="never" nodeType="tmRoot">
           <p:childTnLst>
             <p:seq>
-              <p:cTn id="39" nodeType="mainSeq"/>
+              <p:cTn id="41" nodeType="mainSeq">
+                <p:childTnLst>
+                  <p:par>
+                    <p:cTn id="42" fill="freeze">
+                      <p:stCondLst>
+                        <p:cond delay="indefinite"/>
+                      </p:stCondLst>
+                      <p:childTnLst>
+                        <p:par>
+                          <p:cTn id="43" fill="freeze">
+                            <p:stCondLst>
+                              <p:cond delay="0"/>
+                            </p:stCondLst>
+                            <p:childTnLst>
+                              <p:par>
+                                <p:cTn id="44" nodeType="clickEffect" fill="hold" presetClass="entr" presetID="42">
+                                  <p:stCondLst>
+                                    <p:cond delay="0"/>
+                                  </p:stCondLst>
+                                  <p:childTnLst>
+                                    <p:set>
+                                      <p:cBhvr>
+                                        <p:cTn id="45" dur="1" fill="hold">
+                                          <p:stCondLst>
+                                            <p:cond delay="0"/>
+                                          </p:stCondLst>
+                                        </p:cTn>
+                                        <p:tgtEl>
+                                          <p:spTgt spid="127">
+                                            <p:txEl>
+                                              <p:pRg st="0" end="30"/>
+                                            </p:txEl>
+                                          </p:spTgt>
+                                        </p:tgtEl>
+                                        <p:attrNameLst>
+                                          <p:attrName>style.visibility</p:attrName>
+                                        </p:attrNameLst>
+                                      </p:cBhvr>
+                                      <p:to>
+                                        <p:strVal val="visible"/>
+                                      </p:to>
+                                    </p:set>
+                                    <p:animEffect filter="fade" transition="in">
+                                      <p:cBhvr additive="repl">
+                                        <p:cTn id="46" dur="1000"/>
+                                        <p:tgtEl>
+                                          <p:spTgt spid="127">
+                                            <p:txEl>
+                                              <p:pRg st="0" end="30"/>
+                                            </p:txEl>
+                                          </p:spTgt>
+                                        </p:tgtEl>
+                                      </p:cBhvr>
+                                    </p:animEffect>
+                                    <p:anim calcmode="lin" valueType="num">
+                                      <p:cBhvr additive="repl">
+                                        <p:cTn id="47" dur="1000" fill="hold"/>
+                                        <p:tgtEl>
+                                          <p:spTgt spid="127">
+                                            <p:txEl>
+                                              <p:pRg st="0" end="30"/>
+                                            </p:txEl>
+                                          </p:spTgt>
+                                        </p:tgtEl>
+                                        <p:attrNameLst>
+                                          <p:attrName>ppt_x</p:attrName>
+                                        </p:attrNameLst>
+                                      </p:cBhvr>
+                                      <p:tavLst>
+                                        <p:tav tm="0">
+                                          <p:val>
+                                            <p:strVal val="#ppt_x"/>
+                                          </p:val>
+                                        </p:tav>
+                                        <p:tav tm="100000">
+                                          <p:val>
+                                            <p:strVal val="#ppt_x"/>
+                                          </p:val>
+                                        </p:tav>
+                                      </p:tavLst>
+                                    </p:anim>
+                                    <p:anim calcmode="lin" valueType="num">
+                                      <p:cBhvr additive="repl">
+                                        <p:cTn id="48" dur="1000" fill="hold"/>
+                                        <p:tgtEl>
+                                          <p:spTgt spid="127">
+                                            <p:txEl>
+                                              <p:pRg st="0" end="30"/>
+                                            </p:txEl>
+                                          </p:spTgt>
+                                        </p:tgtEl>
+                                        <p:attrNameLst>
+                                          <p:attrName>ppt_y</p:attrName>
+                                        </p:attrNameLst>
+                                      </p:cBhvr>
+                                      <p:tavLst>
+                                        <p:tav tm="0">
+                                          <p:val>
+                                            <p:strVal val="#ppt_y+.1"/>
+                                          </p:val>
+                                        </p:tav>
+                                        <p:tav tm="100000">
+                                          <p:val>
+                                            <p:strVal val="#ppt_y"/>
+                                          </p:val>
+                                        </p:tav>
+                                      </p:tavLst>
+                                    </p:anim>
+                                  </p:childTnLst>
+                                </p:cTn>
+                              </p:par>
+                            </p:childTnLst>
+                          </p:cTn>
+                        </p:par>
+                      </p:childTnLst>
+                    </p:cTn>
+                  </p:par>
+                </p:childTnLst>
+              </p:cTn>
               <p:prevCondLst>
                 <p:cond delay="0" evt="onPrev">
                   <p:tgtEl>
@@ -6255,7 +6403,7 @@
         <p:spPr>
           <a:xfrm>
             <a:off x="360000" y="301320"/>
-            <a:ext cx="9359640" cy="958320"/>
+            <a:ext cx="9359280" cy="957960"/>
           </a:xfrm>
           <a:prstGeom prst="rect">
             <a:avLst/>
@@ -6285,6 +6433,7 @@
                   <a:srgbClr val="ffffff"/>
                 </a:solidFill>
                 <a:latin typeface="Roboto"/>
+                <a:ea typeface="DejaVu Sans"/>
               </a:rPr>
               <a:t>What is P2P?</a:t>
             </a:r>
@@ -6303,7 +6452,7 @@
         <p:spPr>
           <a:xfrm>
             <a:off x="360000" y="1980000"/>
-            <a:ext cx="9359640" cy="5039640"/>
+            <a:ext cx="9359280" cy="5039280"/>
           </a:xfrm>
           <a:prstGeom prst="rect">
             <a:avLst/>
@@ -6324,7 +6473,7 @@
             <a:normAutofit/>
           </a:bodyPr>
           <a:p>
-            <a:pPr marL="432000" indent="-323640">
+            <a:pPr marL="432000" indent="-323280">
               <a:lnSpc>
                 <a:spcPct val="100000"/>
               </a:lnSpc>
@@ -6344,6 +6493,7 @@
                   <a:srgbClr val="2c3e50"/>
                 </a:solidFill>
                 <a:latin typeface="Source Sans Pro Semibold"/>
+                <a:ea typeface="DejaVu Sans"/>
               </a:rPr>
               <a:t>Peer to Peer as the name suggests is communication between two </a:t>
             </a:r>
@@ -6353,6 +6503,7 @@
                   <a:srgbClr val="2c3e50"/>
                 </a:solidFill>
                 <a:latin typeface="Source Sans Pro Semibold"/>
+                <a:ea typeface="DejaVu Sans"/>
               </a:rPr>
               <a:t>peers </a:t>
             </a:r>
@@ -6362,6 +6513,7 @@
                   <a:srgbClr val="2c3e50"/>
                 </a:solidFill>
                 <a:latin typeface="Source Sans Pro Semibold"/>
+                <a:ea typeface="DejaVu Sans"/>
               </a:rPr>
               <a:t>without the intervention of a sever.</a:t>
             </a:r>
@@ -6370,19 +6522,13 @@
             </a:endParaRPr>
           </a:p>
           <a:p>
-            <a:pPr marL="432000" indent="-323640">
+            <a:pPr>
               <a:lnSpc>
                 <a:spcPct val="100000"/>
               </a:lnSpc>
               <a:spcAft>
                 <a:spcPts val="1414"/>
               </a:spcAft>
-              <a:buClr>
-                <a:srgbClr val="2c3e50"/>
-              </a:buClr>
-              <a:buSzPct val="45000"/>
-              <a:buFont typeface="Wingdings" charset="2"/>
-              <a:buChar char=""/>
             </a:pPr>
             <a:endParaRPr b="0" lang="en-IN" sz="2000" spc="-1" strike="noStrike">
               <a:latin typeface="Arial"/>
@@ -6399,7 +6545,7 @@
         <p:spPr>
           <a:xfrm>
             <a:off x="4558320" y="2967840"/>
-            <a:ext cx="837000" cy="837000"/>
+            <a:ext cx="836640" cy="836640"/>
           </a:xfrm>
           <a:prstGeom prst="ellipse">
             <a:avLst/>
@@ -6422,13 +6568,18 @@
         <p:txBody>
           <a:bodyPr wrap="none" lIns="90000" rIns="90000" tIns="45000" bIns="45000" anchor="ctr"/>
           <a:p>
-            <a:pPr algn="ctr"/>
+            <a:pPr algn="ctr">
+              <a:lnSpc>
+                <a:spcPct val="100000"/>
+              </a:lnSpc>
+            </a:pPr>
             <a:r>
               <a:rPr b="0" lang="en-IN" sz="1800" spc="-1" strike="noStrike">
                 <a:solidFill>
                   <a:srgbClr val="ffffff"/>
                 </a:solidFill>
                 <a:latin typeface="Arial"/>
+                <a:ea typeface="DejaVu Sans"/>
               </a:rPr>
               <a:t>Peer</a:t>
             </a:r>
@@ -6447,7 +6598,7 @@
         <p:spPr>
           <a:xfrm>
             <a:off x="3024000" y="4103280"/>
-            <a:ext cx="837000" cy="837000"/>
+            <a:ext cx="836640" cy="836640"/>
           </a:xfrm>
           <a:prstGeom prst="ellipse">
             <a:avLst/>
@@ -6470,13 +6621,18 @@
         <p:txBody>
           <a:bodyPr wrap="none" lIns="90000" rIns="90000" tIns="45000" bIns="45000" anchor="ctr"/>
           <a:p>
-            <a:pPr algn="ctr"/>
+            <a:pPr algn="ctr">
+              <a:lnSpc>
+                <a:spcPct val="100000"/>
+              </a:lnSpc>
+            </a:pPr>
             <a:r>
               <a:rPr b="0" lang="en-IN" sz="1800" spc="-1" strike="noStrike">
                 <a:solidFill>
                   <a:srgbClr val="ffffff"/>
                 </a:solidFill>
                 <a:latin typeface="Arial"/>
+                <a:ea typeface="DejaVu Sans"/>
               </a:rPr>
               <a:t>Peer</a:t>
             </a:r>
@@ -6495,7 +6651,7 @@
         <p:spPr>
           <a:xfrm>
             <a:off x="6064200" y="4104000"/>
-            <a:ext cx="837000" cy="837000"/>
+            <a:ext cx="836640" cy="836640"/>
           </a:xfrm>
           <a:prstGeom prst="ellipse">
             <a:avLst/>
@@ -6518,13 +6674,18 @@
         <p:txBody>
           <a:bodyPr wrap="none" lIns="90000" rIns="90000" tIns="45000" bIns="45000" anchor="ctr"/>
           <a:p>
-            <a:pPr algn="ctr"/>
+            <a:pPr algn="ctr">
+              <a:lnSpc>
+                <a:spcPct val="100000"/>
+              </a:lnSpc>
+            </a:pPr>
             <a:r>
               <a:rPr b="0" lang="en-IN" sz="1800" spc="-1" strike="noStrike">
                 <a:solidFill>
                   <a:srgbClr val="ffffff"/>
                 </a:solidFill>
                 <a:latin typeface="Arial"/>
+                <a:ea typeface="DejaVu Sans"/>
               </a:rPr>
               <a:t>Peer</a:t>
             </a:r>
@@ -6543,7 +6704,7 @@
         <p:spPr>
           <a:xfrm>
             <a:off x="4558680" y="5351400"/>
-            <a:ext cx="837000" cy="837000"/>
+            <a:ext cx="836640" cy="836640"/>
           </a:xfrm>
           <a:prstGeom prst="ellipse">
             <a:avLst/>
@@ -6566,13 +6727,18 @@
         <p:txBody>
           <a:bodyPr wrap="none" lIns="90000" rIns="90000" tIns="45000" bIns="45000" anchor="ctr"/>
           <a:p>
-            <a:pPr algn="ctr"/>
+            <a:pPr algn="ctr">
+              <a:lnSpc>
+                <a:spcPct val="100000"/>
+              </a:lnSpc>
+            </a:pPr>
             <a:r>
               <a:rPr b="0" lang="en-IN" sz="1800" spc="-1" strike="noStrike">
                 <a:solidFill>
                   <a:srgbClr val="ffffff"/>
                 </a:solidFill>
                 <a:latin typeface="Arial"/>
+                <a:ea typeface="DejaVu Sans"/>
               </a:rPr>
               <a:t>Peer</a:t>
             </a:r>
@@ -6619,7 +6785,7 @@
         <p:spPr>
           <a:xfrm flipH="1">
             <a:off x="3861000" y="4566960"/>
-            <a:ext cx="2203200" cy="0"/>
+            <a:ext cx="2203200" cy="360"/>
           </a:xfrm>
           <a:prstGeom prst="line">
             <a:avLst/>
@@ -6731,7 +6897,7 @@
         <p:spPr>
           <a:xfrm flipV="1">
             <a:off x="4949280" y="3804840"/>
-            <a:ext cx="0" cy="1546560"/>
+            <a:ext cx="360" cy="1546560"/>
           </a:xfrm>
           <a:prstGeom prst="line">
             <a:avLst/>
@@ -6758,10 +6924,489 @@
   <p:timing>
     <p:tnLst>
       <p:par>
-        <p:cTn id="40" dur="indefinite" restart="never" nodeType="tmRoot">
+        <p:cTn id="49" dur="indefinite" restart="never" nodeType="tmRoot">
           <p:childTnLst>
             <p:seq>
-              <p:cTn id="41" nodeType="mainSeq"/>
+              <p:cTn id="50" nodeType="mainSeq">
+                <p:childTnLst>
+                  <p:par>
+                    <p:cTn id="51" fill="freeze">
+                      <p:stCondLst>
+                        <p:cond delay="indefinite"/>
+                      </p:stCondLst>
+                      <p:childTnLst>
+                        <p:par>
+                          <p:cTn id="52" fill="freeze">
+                            <p:stCondLst>
+                              <p:cond delay="0"/>
+                            </p:stCondLst>
+                            <p:childTnLst>
+                              <p:par>
+                                <p:cTn id="53" nodeType="clickEffect" fill="hold" presetClass="entr" presetID="10">
+                                  <p:stCondLst>
+                                    <p:cond delay="0"/>
+                                  </p:stCondLst>
+                                  <p:childTnLst>
+                                    <p:set>
+                                      <p:cBhvr>
+                                        <p:cTn id="54" dur="0" fill="hold">
+                                          <p:stCondLst>
+                                            <p:cond delay="0"/>
+                                          </p:stCondLst>
+                                        </p:cTn>
+                                        <p:tgtEl>
+                                          <p:spTgt spid="130"/>
+                                        </p:tgtEl>
+                                        <p:attrNameLst>
+                                          <p:attrName>style.visibility</p:attrName>
+                                        </p:attrNameLst>
+                                      </p:cBhvr>
+                                      <p:to>
+                                        <p:strVal val="visible"/>
+                                      </p:to>
+                                    </p:set>
+                                    <p:animEffect filter="fade" transition="in">
+                                      <p:cBhvr additive="repl">
+                                        <p:cTn id="55" dur="1000"/>
+                                        <p:tgtEl>
+                                          <p:spTgt spid="130"/>
+                                        </p:tgtEl>
+                                      </p:cBhvr>
+                                    </p:animEffect>
+                                  </p:childTnLst>
+                                </p:cTn>
+                              </p:par>
+                              <p:par>
+                                <p:cTn id="56" nodeType="withEffect" fill="hold" presetClass="entr" presetID="10">
+                                  <p:stCondLst>
+                                    <p:cond delay="0"/>
+                                  </p:stCondLst>
+                                  <p:childTnLst>
+                                    <p:set>
+                                      <p:cBhvr>
+                                        <p:cTn id="57" dur="0" fill="hold">
+                                          <p:stCondLst>
+                                            <p:cond delay="0"/>
+                                          </p:stCondLst>
+                                        </p:cTn>
+                                        <p:tgtEl>
+                                          <p:spTgt spid="131"/>
+                                        </p:tgtEl>
+                                        <p:attrNameLst>
+                                          <p:attrName>style.visibility</p:attrName>
+                                        </p:attrNameLst>
+                                      </p:cBhvr>
+                                      <p:to>
+                                        <p:strVal val="visible"/>
+                                      </p:to>
+                                    </p:set>
+                                    <p:animEffect filter="fade" transition="in">
+                                      <p:cBhvr additive="repl">
+                                        <p:cTn id="58" dur="1000"/>
+                                        <p:tgtEl>
+                                          <p:spTgt spid="131"/>
+                                        </p:tgtEl>
+                                      </p:cBhvr>
+                                    </p:animEffect>
+                                  </p:childTnLst>
+                                </p:cTn>
+                              </p:par>
+                              <p:par>
+                                <p:cTn id="59" nodeType="withEffect" fill="hold" presetClass="entr" presetID="10">
+                                  <p:stCondLst>
+                                    <p:cond delay="0"/>
+                                  </p:stCondLst>
+                                  <p:childTnLst>
+                                    <p:set>
+                                      <p:cBhvr>
+                                        <p:cTn id="60" dur="0" fill="hold">
+                                          <p:stCondLst>
+                                            <p:cond delay="0"/>
+                                          </p:stCondLst>
+                                        </p:cTn>
+                                        <p:tgtEl>
+                                          <p:spTgt spid="132"/>
+                                        </p:tgtEl>
+                                        <p:attrNameLst>
+                                          <p:attrName>style.visibility</p:attrName>
+                                        </p:attrNameLst>
+                                      </p:cBhvr>
+                                      <p:to>
+                                        <p:strVal val="visible"/>
+                                      </p:to>
+                                    </p:set>
+                                    <p:animEffect filter="fade" transition="in">
+                                      <p:cBhvr additive="repl">
+                                        <p:cTn id="61" dur="1000"/>
+                                        <p:tgtEl>
+                                          <p:spTgt spid="132"/>
+                                        </p:tgtEl>
+                                      </p:cBhvr>
+                                    </p:animEffect>
+                                  </p:childTnLst>
+                                </p:cTn>
+                              </p:par>
+                              <p:par>
+                                <p:cTn id="62" nodeType="withEffect" fill="hold" presetClass="entr" presetID="10">
+                                  <p:stCondLst>
+                                    <p:cond delay="0"/>
+                                  </p:stCondLst>
+                                  <p:childTnLst>
+                                    <p:set>
+                                      <p:cBhvr>
+                                        <p:cTn id="63" dur="0" fill="hold">
+                                          <p:stCondLst>
+                                            <p:cond delay="0"/>
+                                          </p:stCondLst>
+                                        </p:cTn>
+                                        <p:tgtEl>
+                                          <p:spTgt spid="133"/>
+                                        </p:tgtEl>
+                                        <p:attrNameLst>
+                                          <p:attrName>style.visibility</p:attrName>
+                                        </p:attrNameLst>
+                                      </p:cBhvr>
+                                      <p:to>
+                                        <p:strVal val="visible"/>
+                                      </p:to>
+                                    </p:set>
+                                    <p:animEffect filter="fade" transition="in">
+                                      <p:cBhvr additive="repl">
+                                        <p:cTn id="64" dur="1000"/>
+                                        <p:tgtEl>
+                                          <p:spTgt spid="133"/>
+                                        </p:tgtEl>
+                                      </p:cBhvr>
+                                    </p:animEffect>
+                                  </p:childTnLst>
+                                </p:cTn>
+                              </p:par>
+                            </p:childTnLst>
+                          </p:cTn>
+                        </p:par>
+                      </p:childTnLst>
+                    </p:cTn>
+                  </p:par>
+                  <p:par>
+                    <p:cTn id="65" fill="freeze">
+                      <p:stCondLst>
+                        <p:cond delay="indefinite"/>
+                      </p:stCondLst>
+                      <p:childTnLst>
+                        <p:par>
+                          <p:cTn id="66" fill="freeze">
+                            <p:stCondLst>
+                              <p:cond delay="0"/>
+                            </p:stCondLst>
+                            <p:childTnLst>
+                              <p:par>
+                                <p:cTn id="67" nodeType="clickEffect" fill="hold" presetClass="entr" presetID="3" presetSubtype="10">
+                                  <p:stCondLst>
+                                    <p:cond delay="0"/>
+                                  </p:stCondLst>
+                                  <p:childTnLst>
+                                    <p:set>
+                                      <p:cBhvr>
+                                        <p:cTn id="68" dur="1" fill="hold">
+                                          <p:stCondLst>
+                                            <p:cond delay="0"/>
+                                          </p:stCondLst>
+                                        </p:cTn>
+                                        <p:tgtEl>
+                                          <p:spTgt spid="134"/>
+                                        </p:tgtEl>
+                                        <p:attrNameLst>
+                                          <p:attrName>style.visibility</p:attrName>
+                                        </p:attrNameLst>
+                                      </p:cBhvr>
+                                      <p:to>
+                                        <p:strVal val="visible"/>
+                                      </p:to>
+                                    </p:set>
+                                    <p:animEffect filter="blinds(horizontal)" transition="in">
+                                      <p:cBhvr additive="repl">
+                                        <p:cTn id="69" dur="500"/>
+                                        <p:tgtEl>
+                                          <p:spTgt spid="134"/>
+                                        </p:tgtEl>
+                                      </p:cBhvr>
+                                    </p:animEffect>
+                                  </p:childTnLst>
+                                </p:cTn>
+                              </p:par>
+                            </p:childTnLst>
+                          </p:cTn>
+                        </p:par>
+                      </p:childTnLst>
+                    </p:cTn>
+                  </p:par>
+                  <p:par>
+                    <p:cTn id="70" fill="freeze">
+                      <p:stCondLst>
+                        <p:cond delay="indefinite"/>
+                      </p:stCondLst>
+                      <p:childTnLst>
+                        <p:par>
+                          <p:cTn id="71" fill="freeze">
+                            <p:stCondLst>
+                              <p:cond delay="0"/>
+                            </p:stCondLst>
+                            <p:childTnLst>
+                              <p:par>
+                                <p:cTn id="72" nodeType="clickEffect" fill="hold" presetClass="entr" presetID="3" presetSubtype="10">
+                                  <p:stCondLst>
+                                    <p:cond delay="0"/>
+                                  </p:stCondLst>
+                                  <p:childTnLst>
+                                    <p:set>
+                                      <p:cBhvr>
+                                        <p:cTn id="73" dur="1" fill="hold">
+                                          <p:stCondLst>
+                                            <p:cond delay="0"/>
+                                          </p:stCondLst>
+                                        </p:cTn>
+                                        <p:tgtEl>
+                                          <p:spTgt spid="137"/>
+                                        </p:tgtEl>
+                                        <p:attrNameLst>
+                                          <p:attrName>style.visibility</p:attrName>
+                                        </p:attrNameLst>
+                                      </p:cBhvr>
+                                      <p:to>
+                                        <p:strVal val="visible"/>
+                                      </p:to>
+                                    </p:set>
+                                    <p:animEffect filter="blinds(horizontal)" transition="in">
+                                      <p:cBhvr additive="repl">
+                                        <p:cTn id="74" dur="500"/>
+                                        <p:tgtEl>
+                                          <p:spTgt spid="137"/>
+                                        </p:tgtEl>
+                                      </p:cBhvr>
+                                    </p:animEffect>
+                                  </p:childTnLst>
+                                </p:cTn>
+                              </p:par>
+                            </p:childTnLst>
+                          </p:cTn>
+                        </p:par>
+                      </p:childTnLst>
+                    </p:cTn>
+                  </p:par>
+                  <p:par>
+                    <p:cTn id="75" fill="freeze">
+                      <p:stCondLst>
+                        <p:cond delay="indefinite"/>
+                      </p:stCondLst>
+                      <p:childTnLst>
+                        <p:par>
+                          <p:cTn id="76" fill="freeze">
+                            <p:stCondLst>
+                              <p:cond delay="0"/>
+                            </p:stCondLst>
+                            <p:childTnLst>
+                              <p:par>
+                                <p:cTn id="77" nodeType="clickEffect" fill="hold" presetClass="entr" presetID="3" presetSubtype="10">
+                                  <p:stCondLst>
+                                    <p:cond delay="0"/>
+                                  </p:stCondLst>
+                                  <p:childTnLst>
+                                    <p:set>
+                                      <p:cBhvr>
+                                        <p:cTn id="78" dur="1" fill="hold">
+                                          <p:stCondLst>
+                                            <p:cond delay="0"/>
+                                          </p:stCondLst>
+                                        </p:cTn>
+                                        <p:tgtEl>
+                                          <p:spTgt spid="138"/>
+                                        </p:tgtEl>
+                                        <p:attrNameLst>
+                                          <p:attrName>style.visibility</p:attrName>
+                                        </p:attrNameLst>
+                                      </p:cBhvr>
+                                      <p:to>
+                                        <p:strVal val="visible"/>
+                                      </p:to>
+                                    </p:set>
+                                    <p:animEffect filter="blinds(horizontal)" transition="in">
+                                      <p:cBhvr additive="repl">
+                                        <p:cTn id="79" dur="500"/>
+                                        <p:tgtEl>
+                                          <p:spTgt spid="138"/>
+                                        </p:tgtEl>
+                                      </p:cBhvr>
+                                    </p:animEffect>
+                                  </p:childTnLst>
+                                </p:cTn>
+                              </p:par>
+                            </p:childTnLst>
+                          </p:cTn>
+                        </p:par>
+                      </p:childTnLst>
+                    </p:cTn>
+                  </p:par>
+                  <p:par>
+                    <p:cTn id="80" fill="freeze">
+                      <p:stCondLst>
+                        <p:cond delay="indefinite"/>
+                      </p:stCondLst>
+                      <p:childTnLst>
+                        <p:par>
+                          <p:cTn id="81" fill="freeze">
+                            <p:stCondLst>
+                              <p:cond delay="0"/>
+                            </p:stCondLst>
+                            <p:childTnLst>
+                              <p:par>
+                                <p:cTn id="82" nodeType="clickEffect" fill="hold" presetClass="entr" presetID="3" presetSubtype="10">
+                                  <p:stCondLst>
+                                    <p:cond delay="0"/>
+                                  </p:stCondLst>
+                                  <p:childTnLst>
+                                    <p:set>
+                                      <p:cBhvr>
+                                        <p:cTn id="83" dur="1" fill="hold">
+                                          <p:stCondLst>
+                                            <p:cond delay="0"/>
+                                          </p:stCondLst>
+                                        </p:cTn>
+                                        <p:tgtEl>
+                                          <p:spTgt spid="136"/>
+                                        </p:tgtEl>
+                                        <p:attrNameLst>
+                                          <p:attrName>style.visibility</p:attrName>
+                                        </p:attrNameLst>
+                                      </p:cBhvr>
+                                      <p:to>
+                                        <p:strVal val="visible"/>
+                                      </p:to>
+                                    </p:set>
+                                    <p:animEffect filter="blinds(horizontal)" transition="in">
+                                      <p:cBhvr additive="repl">
+                                        <p:cTn id="84" dur="500"/>
+                                        <p:tgtEl>
+                                          <p:spTgt spid="136"/>
+                                        </p:tgtEl>
+                                      </p:cBhvr>
+                                    </p:animEffect>
+                                  </p:childTnLst>
+                                </p:cTn>
+                              </p:par>
+                            </p:childTnLst>
+                          </p:cTn>
+                        </p:par>
+                      </p:childTnLst>
+                    </p:cTn>
+                  </p:par>
+                  <p:par>
+                    <p:cTn id="85" fill="freeze">
+                      <p:stCondLst>
+                        <p:cond delay="indefinite"/>
+                      </p:stCondLst>
+                      <p:childTnLst>
+                        <p:par>
+                          <p:cTn id="86" fill="freeze">
+                            <p:stCondLst>
+                              <p:cond delay="0"/>
+                            </p:stCondLst>
+                            <p:childTnLst>
+                              <p:par>
+                                <p:cTn id="87" nodeType="clickEffect" fill="hold" presetClass="entr" presetID="3" presetSubtype="10">
+                                  <p:stCondLst>
+                                    <p:cond delay="0"/>
+                                  </p:stCondLst>
+                                  <p:childTnLst>
+                                    <p:set>
+                                      <p:cBhvr>
+                                        <p:cTn id="88" dur="1" fill="hold">
+                                          <p:stCondLst>
+                                            <p:cond delay="0"/>
+                                          </p:stCondLst>
+                                        </p:cTn>
+                                        <p:tgtEl>
+                                          <p:spTgt spid="135"/>
+                                        </p:tgtEl>
+                                        <p:attrNameLst>
+                                          <p:attrName>style.visibility</p:attrName>
+                                        </p:attrNameLst>
+                                      </p:cBhvr>
+                                      <p:to>
+                                        <p:strVal val="visible"/>
+                                      </p:to>
+                                    </p:set>
+                                    <p:animEffect filter="blinds(horizontal)" transition="in">
+                                      <p:cBhvr additive="repl">
+                                        <p:cTn id="89" dur="500"/>
+                                        <p:tgtEl>
+                                          <p:spTgt spid="135"/>
+                                        </p:tgtEl>
+                                      </p:cBhvr>
+                                    </p:animEffect>
+                                  </p:childTnLst>
+                                </p:cTn>
+                              </p:par>
+                            </p:childTnLst>
+                          </p:cTn>
+                        </p:par>
+                      </p:childTnLst>
+                    </p:cTn>
+                  </p:par>
+                  <p:par>
+                    <p:cTn id="90" fill="freeze">
+                      <p:stCondLst>
+                        <p:cond delay="indefinite"/>
+                      </p:stCondLst>
+                      <p:childTnLst>
+                        <p:par>
+                          <p:cTn id="91" fill="freeze">
+                            <p:stCondLst>
+                              <p:cond delay="0"/>
+                            </p:stCondLst>
+                            <p:childTnLst>
+                              <p:par>
+                                <p:cTn id="92" nodeType="clickEffect" fill="hold" presetClass="entr" presetID="3" presetSubtype="10">
+                                  <p:stCondLst>
+                                    <p:cond delay="0"/>
+                                  </p:stCondLst>
+                                  <p:childTnLst>
+                                    <p:set>
+                                      <p:cBhvr>
+                                        <p:cTn id="93" dur="1" fill="hold">
+                                          <p:stCondLst>
+                                            <p:cond delay="0"/>
+                                          </p:stCondLst>
+                                        </p:cTn>
+                                        <p:tgtEl>
+                                          <p:spTgt spid="139"/>
+                                        </p:tgtEl>
+                                        <p:attrNameLst>
+                                          <p:attrName>style.visibility</p:attrName>
+                                        </p:attrNameLst>
+                                      </p:cBhvr>
+                                      <p:to>
+                                        <p:strVal val="visible"/>
+                                      </p:to>
+                                    </p:set>
+                                    <p:animEffect filter="blinds(horizontal)" transition="in">
+                                      <p:cBhvr additive="repl">
+                                        <p:cTn id="94" dur="500"/>
+                                        <p:tgtEl>
+                                          <p:spTgt spid="139"/>
+                                        </p:tgtEl>
+                                      </p:cBhvr>
+                                    </p:animEffect>
+                                  </p:childTnLst>
+                                </p:cTn>
+                              </p:par>
+                            </p:childTnLst>
+                          </p:cTn>
+                        </p:par>
+                      </p:childTnLst>
+                    </p:cTn>
+                  </p:par>
+                </p:childTnLst>
+              </p:cTn>
               <p:prevCondLst>
                 <p:cond delay="0" evt="onPrev">
                   <p:tgtEl>
@@ -6811,7 +7456,7 @@
         <p:spPr>
           <a:xfrm>
             <a:off x="360000" y="301320"/>
-            <a:ext cx="9359640" cy="958320"/>
+            <a:ext cx="9359280" cy="957960"/>
           </a:xfrm>
           <a:prstGeom prst="rect">
             <a:avLst/>
@@ -6841,6 +7486,7 @@
                   <a:srgbClr val="ffffff"/>
                 </a:solidFill>
                 <a:latin typeface="Roboto"/>
+                <a:ea typeface="DejaVu Sans"/>
               </a:rPr>
               <a:t>Advantages</a:t>
             </a:r>
@@ -6859,7 +7505,7 @@
         <p:spPr>
           <a:xfrm>
             <a:off x="360000" y="1980000"/>
-            <a:ext cx="9359640" cy="5039640"/>
+            <a:ext cx="9359280" cy="5039280"/>
           </a:xfrm>
           <a:prstGeom prst="rect">
             <a:avLst/>
@@ -6884,10 +7530,10 @@
   <p:timing>
     <p:tnLst>
       <p:par>
-        <p:cTn id="42" dur="indefinite" restart="never" nodeType="tmRoot">
+        <p:cTn id="95" dur="indefinite" restart="never" nodeType="tmRoot">
           <p:childTnLst>
             <p:seq>
-              <p:cTn id="43" nodeType="mainSeq"/>
+              <p:cTn id="96" nodeType="mainSeq"/>
               <p:prevCondLst>
                 <p:cond delay="0" evt="onPrev">
                   <p:tgtEl>
@@ -6937,7 +7583,7 @@
         <p:spPr>
           <a:xfrm>
             <a:off x="2700000" y="2700000"/>
-            <a:ext cx="4679640" cy="2159640"/>
+            <a:ext cx="4679280" cy="2159280"/>
           </a:xfrm>
           <a:prstGeom prst="rect">
             <a:avLst/>
@@ -6959,10 +7605,10 @@
   <p:timing>
     <p:tnLst>
       <p:par>
-        <p:cTn id="44" dur="indefinite" restart="never" nodeType="tmRoot">
+        <p:cTn id="97" dur="indefinite" restart="never" nodeType="tmRoot">
           <p:childTnLst>
             <p:seq>
-              <p:cTn id="45" nodeType="mainSeq"/>
+              <p:cTn id="98" nodeType="mainSeq"/>
               <p:prevCondLst>
                 <p:cond delay="0" evt="onPrev">
                   <p:tgtEl>

</xml_diff>